<commit_message>
updating draft of lecture 2
</commit_message>
<xml_diff>
--- a/Lectures/MPhil_Data_Intensive_Science_Lectures/Lecture 16.pptx
+++ b/Lectures/MPhil_Data_Intensive_Science_Lectures/Lecture 16.pptx
@@ -5,7 +5,7 @@
     <p:sldMasterId id="2147483648" r:id="rId1"/>
   </p:sldMasterIdLst>
   <p:notesMasterIdLst>
-    <p:notesMasterId r:id="rId23"/>
+    <p:notesMasterId r:id="rId29"/>
   </p:notesMasterIdLst>
   <p:sldIdLst>
     <p:sldId id="256" r:id="rId2"/>
@@ -28,7 +28,13 @@
     <p:sldId id="261" r:id="rId19"/>
     <p:sldId id="278" r:id="rId20"/>
     <p:sldId id="279" r:id="rId21"/>
-    <p:sldId id="262" r:id="rId22"/>
+    <p:sldId id="285" r:id="rId22"/>
+    <p:sldId id="280" r:id="rId23"/>
+    <p:sldId id="262" r:id="rId24"/>
+    <p:sldId id="281" r:id="rId25"/>
+    <p:sldId id="282" r:id="rId26"/>
+    <p:sldId id="284" r:id="rId27"/>
+    <p:sldId id="283" r:id="rId28"/>
   </p:sldIdLst>
   <p:sldSz cx="12192000" cy="6858000"/>
   <p:notesSz cx="6858000" cy="9144000"/>
@@ -217,7 +223,7 @@
           <a:p>
             <a:fld id="{D47FBB92-ED3A-5342-B794-107843372547}" type="datetimeFigureOut">
               <a:rPr lang="en-US" smtClean="0"/>
-              <a:t>2/22/24</a:t>
+              <a:t>2/24/24</a:t>
             </a:fld>
             <a:endParaRPr lang="en-US"/>
           </a:p>
@@ -4131,8 +4137,8 @@
           </a:p>
         </p:txBody>
       </p:sp>
-      <mc:AlternateContent xmlns:mc="http://schemas.openxmlformats.org/markup-compatibility/2006">
-        <mc:Choice xmlns:a14="http://schemas.microsoft.com/office/drawing/2010/main" Requires="a14">
+      <mc:AlternateContent xmlns:mc="http://schemas.openxmlformats.org/markup-compatibility/2006" xmlns:a14="http://schemas.microsoft.com/office/drawing/2010/main">
+        <mc:Choice Requires="a14">
           <p:sp>
             <p:nvSpPr>
               <p:cNvPr id="3" name="Content Placeholder 2">
@@ -4314,7 +4320,7 @@
             </p:txBody>
           </p:sp>
         </mc:Choice>
-        <mc:Fallback>
+        <mc:Fallback xmlns="">
           <p:sp>
             <p:nvSpPr>
               <p:cNvPr id="3" name="Content Placeholder 2">
@@ -4536,8 +4542,8 @@
           </a:p>
         </p:txBody>
       </p:sp>
-      <mc:AlternateContent xmlns:mc="http://schemas.openxmlformats.org/markup-compatibility/2006">
-        <mc:Choice xmlns:a14="http://schemas.microsoft.com/office/drawing/2010/main" Requires="a14">
+      <mc:AlternateContent xmlns:mc="http://schemas.openxmlformats.org/markup-compatibility/2006" xmlns:a14="http://schemas.microsoft.com/office/drawing/2010/main">
+        <mc:Choice Requires="a14">
           <p:sp>
             <p:nvSpPr>
               <p:cNvPr id="3" name="Content Placeholder 2">
@@ -4675,7 +4681,7 @@
             </p:txBody>
           </p:sp>
         </mc:Choice>
-        <mc:Fallback>
+        <mc:Fallback xmlns="">
           <p:sp>
             <p:nvSpPr>
               <p:cNvPr id="3" name="Content Placeholder 2">
@@ -5118,8 +5124,8 @@
           </a:p>
         </p:txBody>
       </p:sp>
-      <mc:AlternateContent xmlns:mc="http://schemas.openxmlformats.org/markup-compatibility/2006">
-        <mc:Choice xmlns:a14="http://schemas.microsoft.com/office/drawing/2010/main" Requires="a14">
+      <mc:AlternateContent xmlns:mc="http://schemas.openxmlformats.org/markup-compatibility/2006" xmlns:a14="http://schemas.microsoft.com/office/drawing/2010/main">
+        <mc:Choice Requires="a14">
           <p:sp>
             <p:nvSpPr>
               <p:cNvPr id="15" name="TextBox 14">
@@ -5148,6 +5154,7 @@
               </a:bodyPr>
               <a:lstStyle/>
               <a:p>
+                <a:pPr/>
                 <a14:m>
                   <m:oMathPara xmlns:m="http://schemas.openxmlformats.org/officeDocument/2006/math">
                     <m:oMathParaPr>
@@ -5209,7 +5216,7 @@
             </p:txBody>
           </p:sp>
         </mc:Choice>
-        <mc:Fallback>
+        <mc:Fallback xmlns="">
           <p:sp>
             <p:nvSpPr>
               <p:cNvPr id="15" name="TextBox 14">
@@ -5568,8 +5575,8 @@
           <a:chExt cx="0" cy="0"/>
         </a:xfrm>
       </p:grpSpPr>
-      <mc:AlternateContent xmlns:mc="http://schemas.openxmlformats.org/markup-compatibility/2006">
-        <mc:Choice xmlns:a14="http://schemas.microsoft.com/office/drawing/2010/main" Requires="a14">
+      <mc:AlternateContent xmlns:mc="http://schemas.openxmlformats.org/markup-compatibility/2006" xmlns:a14="http://schemas.microsoft.com/office/drawing/2010/main">
+        <mc:Choice Requires="a14">
           <p:sp>
             <p:nvSpPr>
               <p:cNvPr id="2" name="Title 1">
@@ -5628,7 +5635,7 @@
             </p:txBody>
           </p:sp>
         </mc:Choice>
-        <mc:Fallback>
+        <mc:Fallback xmlns="">
           <p:sp>
             <p:nvSpPr>
               <p:cNvPr id="2" name="Title 1">
@@ -5814,8 +5821,8 @@
           <a:chExt cx="0" cy="0"/>
         </a:xfrm>
       </p:grpSpPr>
-      <mc:AlternateContent xmlns:mc="http://schemas.openxmlformats.org/markup-compatibility/2006">
-        <mc:Choice xmlns:a14="http://schemas.microsoft.com/office/drawing/2010/main" Requires="a14">
+      <mc:AlternateContent xmlns:mc="http://schemas.openxmlformats.org/markup-compatibility/2006" xmlns:a14="http://schemas.microsoft.com/office/drawing/2010/main">
+        <mc:Choice Requires="a14">
           <p:sp>
             <p:nvSpPr>
               <p:cNvPr id="2" name="Title 1">
@@ -5874,7 +5881,7 @@
             </p:txBody>
           </p:sp>
         </mc:Choice>
-        <mc:Fallback>
+        <mc:Fallback xmlns="">
           <p:sp>
             <p:nvSpPr>
               <p:cNvPr id="2" name="Title 1">
@@ -6060,8 +6067,8 @@
           <a:chExt cx="0" cy="0"/>
         </a:xfrm>
       </p:grpSpPr>
-      <mc:AlternateContent xmlns:mc="http://schemas.openxmlformats.org/markup-compatibility/2006">
-        <mc:Choice xmlns:a14="http://schemas.microsoft.com/office/drawing/2010/main" Requires="a14">
+      <mc:AlternateContent xmlns:mc="http://schemas.openxmlformats.org/markup-compatibility/2006" xmlns:a14="http://schemas.microsoft.com/office/drawing/2010/main">
+        <mc:Choice Requires="a14">
           <p:sp>
             <p:nvSpPr>
               <p:cNvPr id="2" name="Title 1">
@@ -6120,7 +6127,7 @@
             </p:txBody>
           </p:sp>
         </mc:Choice>
-        <mc:Fallback>
+        <mc:Fallback xmlns="">
           <p:sp>
             <p:nvSpPr>
               <p:cNvPr id="2" name="Title 1">
@@ -6327,7 +6334,6 @@
           <a:bodyPr/>
           <a:lstStyle/>
           <a:p>
-            <a:pPr/>
             <a:r>
               <a:rPr lang="en-US" dirty="0">
                 <a:solidFill>
@@ -6547,7 +6553,6 @@
           <a:bodyPr/>
           <a:lstStyle/>
           <a:p>
-            <a:pPr/>
             <a:r>
               <a:rPr lang="en-US" dirty="0">
                 <a:solidFill>
@@ -6718,7 +6723,7 @@
               <a:p>
                 <a:r>
                   <a:rPr lang="en-GB" dirty="0"/>
-                  <a:t>Not amortized? Basically, means that if our data changes we have to repeat most of the process including</a:t>
+                  <a:t>Not amortized? Basically, means that if our data changes we have to repeat most of the process</a:t>
                 </a:r>
               </a:p>
             </p:txBody>
@@ -6973,7 +6978,6 @@
           <a:bodyPr/>
           <a:lstStyle/>
           <a:p>
-            <a:pPr/>
             <a:r>
               <a:rPr lang="en-US" dirty="0">
                 <a:solidFill>
@@ -7153,7 +7157,7 @@
               <a:p>
                 <a:r>
                   <a:rPr lang="en-GB" dirty="0"/>
-                  <a:t>Specifically we use normalising flows (NFs)</a:t>
+                  <a:t>Specifically, we use normalising flows (NFs)</a:t>
                 </a:r>
               </a:p>
               <a:p>
@@ -7466,14 +7470,13 @@
           <a:bodyPr/>
           <a:lstStyle/>
           <a:p>
-            <a:pPr/>
             <a:r>
               <a:rPr lang="en-US" dirty="0">
                 <a:solidFill>
                   <a:srgbClr val="C00000"/>
                 </a:solidFill>
               </a:rPr>
-              <a:t>Normalizing Flows</a:t>
+              <a:t>Normalizing Flows (NFs)</a:t>
             </a:r>
           </a:p>
         </p:txBody>
@@ -7592,7 +7595,54 @@
           </a:bodyPr>
           <a:lstStyle/>
           <a:p>
+            <a:r>
+              <a:rPr lang="en-GB" dirty="0"/>
+              <a:t>Invertible transformation from some known distribution (a multi-variate Gaussian) to a more complex target distribution (a posterior for example)</a:t>
+            </a:r>
+          </a:p>
+          <a:p>
             <a:endParaRPr lang="en-GB" dirty="0"/>
+          </a:p>
+          <a:p>
+            <a:r>
+              <a:rPr lang="en-GB" dirty="0"/>
+              <a:t>Many different types of NFs</a:t>
+            </a:r>
+          </a:p>
+          <a:p>
+            <a:endParaRPr lang="en-GB" dirty="0"/>
+          </a:p>
+          <a:p>
+            <a:r>
+              <a:rPr lang="en-GB" dirty="0"/>
+              <a:t>Focusing on Masked Autoregressive Flows (MAF) which comprises of a series of Masked Autoencoder for Distribution Estimation (MADE, </a:t>
+            </a:r>
+            <a:r>
+              <a:rPr lang="en-GB" b="0" u="none" strike="noStrike" dirty="0" err="1">
+                <a:solidFill>
+                  <a:srgbClr val="212529"/>
+                </a:solidFill>
+                <a:effectLst/>
+                <a:latin typeface="-apple-system"/>
+                <a:hlinkClick r:id="rId2"/>
+              </a:rPr>
+              <a:t>Papamakarios</a:t>
+            </a:r>
+            <a:r>
+              <a:rPr lang="en-GB" b="0" u="none" strike="noStrike" dirty="0">
+                <a:solidFill>
+                  <a:srgbClr val="212529"/>
+                </a:solidFill>
+                <a:effectLst/>
+                <a:latin typeface="-apple-system"/>
+                <a:hlinkClick r:id="rId2"/>
+              </a:rPr>
+              <a:t> et al 2017</a:t>
+            </a:r>
+            <a:r>
+              <a:rPr lang="en-GB" dirty="0"/>
+              <a:t>) neural networks</a:t>
+            </a:r>
           </a:p>
         </p:txBody>
       </p:sp>
@@ -7642,6 +7692,1032 @@
             <p:ph type="title"/>
           </p:nvPr>
         </p:nvSpPr>
+        <p:spPr/>
+        <p:txBody>
+          <a:bodyPr/>
+          <a:lstStyle/>
+          <a:p>
+            <a:r>
+              <a:rPr lang="en-US" dirty="0">
+                <a:solidFill>
+                  <a:srgbClr val="C00000"/>
+                </a:solidFill>
+              </a:rPr>
+              <a:t>Normalizing Flows (NFs)</a:t>
+            </a:r>
+          </a:p>
+        </p:txBody>
+      </p:sp>
+      <p:sp>
+        <p:nvSpPr>
+          <p:cNvPr id="4" name="Footer Placeholder 3">
+            <a:extLst>
+              <a:ext uri="{FF2B5EF4-FFF2-40B4-BE49-F238E27FC236}">
+                <a16:creationId xmlns:a16="http://schemas.microsoft.com/office/drawing/2014/main" id="{5B37B85D-4118-2515-D53D-475C4E66C472}"/>
+              </a:ext>
+            </a:extLst>
+          </p:cNvPr>
+          <p:cNvSpPr>
+            <a:spLocks noGrp="1"/>
+          </p:cNvSpPr>
+          <p:nvPr>
+            <p:ph type="ftr" sz="quarter" idx="11"/>
+          </p:nvPr>
+        </p:nvSpPr>
+        <p:spPr/>
+        <p:txBody>
+          <a:bodyPr/>
+          <a:lstStyle/>
+          <a:p>
+            <a:r>
+              <a:rPr lang="en-US"/>
+              <a:t>MPhil in DIS - Data Driven Radio Astronomy in the SKA era</a:t>
+            </a:r>
+          </a:p>
+        </p:txBody>
+      </p:sp>
+      <p:sp>
+        <p:nvSpPr>
+          <p:cNvPr id="5" name="Slide Number Placeholder 4">
+            <a:extLst>
+              <a:ext uri="{FF2B5EF4-FFF2-40B4-BE49-F238E27FC236}">
+                <a16:creationId xmlns:a16="http://schemas.microsoft.com/office/drawing/2014/main" id="{DF1CED66-178C-490A-3189-D188E2783F5F}"/>
+              </a:ext>
+            </a:extLst>
+          </p:cNvPr>
+          <p:cNvSpPr>
+            <a:spLocks noGrp="1"/>
+          </p:cNvSpPr>
+          <p:nvPr>
+            <p:ph type="sldNum" sz="quarter" idx="12"/>
+          </p:nvPr>
+        </p:nvSpPr>
+        <p:spPr/>
+        <p:txBody>
+          <a:bodyPr/>
+          <a:lstStyle/>
+          <a:p>
+            <a:fld id="{9AA976C4-0B8A-7C44-883E-604AFF758C0B}" type="slidenum">
+              <a:rPr lang="en-US" smtClean="0"/>
+              <a:t>21</a:t>
+            </a:fld>
+            <a:endParaRPr lang="en-US"/>
+          </a:p>
+        </p:txBody>
+      </p:sp>
+      <p:sp>
+        <p:nvSpPr>
+          <p:cNvPr id="6" name="Date Placeholder 5">
+            <a:extLst>
+              <a:ext uri="{FF2B5EF4-FFF2-40B4-BE49-F238E27FC236}">
+                <a16:creationId xmlns:a16="http://schemas.microsoft.com/office/drawing/2014/main" id="{4E6B5B9F-EDA9-548A-4004-336F2CE389B6}"/>
+              </a:ext>
+            </a:extLst>
+          </p:cNvPr>
+          <p:cNvSpPr>
+            <a:spLocks noGrp="1"/>
+          </p:cNvSpPr>
+          <p:nvPr>
+            <p:ph type="dt" sz="half" idx="10"/>
+          </p:nvPr>
+        </p:nvSpPr>
+        <p:spPr/>
+        <p:txBody>
+          <a:bodyPr/>
+          <a:lstStyle/>
+          <a:p>
+            <a:r>
+              <a:rPr lang="en-GB"/>
+              <a:t>2024</a:t>
+            </a:r>
+            <a:endParaRPr lang="en-US"/>
+          </a:p>
+        </p:txBody>
+      </p:sp>
+      <mc:AlternateContent xmlns:mc="http://schemas.openxmlformats.org/markup-compatibility/2006">
+        <mc:Choice xmlns:a14="http://schemas.microsoft.com/office/drawing/2010/main" Requires="a14">
+          <p:sp>
+            <p:nvSpPr>
+              <p:cNvPr id="3" name="Content Placeholder 2">
+                <a:extLst>
+                  <a:ext uri="{FF2B5EF4-FFF2-40B4-BE49-F238E27FC236}">
+                    <a16:creationId xmlns:a16="http://schemas.microsoft.com/office/drawing/2014/main" id="{E8875089-E0CA-BAAB-8119-D759BDD7DFD5}"/>
+                  </a:ext>
+                </a:extLst>
+              </p:cNvPr>
+              <p:cNvSpPr>
+                <a:spLocks noGrp="1"/>
+              </p:cNvSpPr>
+              <p:nvPr>
+                <p:ph idx="1"/>
+              </p:nvPr>
+            </p:nvSpPr>
+            <p:spPr>
+              <a:xfrm>
+                <a:off x="838200" y="1614009"/>
+                <a:ext cx="10054820" cy="4562954"/>
+              </a:xfrm>
+            </p:spPr>
+            <p:txBody>
+              <a:bodyPr>
+                <a:normAutofit lnSpcReduction="10000"/>
+              </a:bodyPr>
+              <a:lstStyle/>
+              <a:p>
+                <a:r>
+                  <a:rPr lang="en-GB" dirty="0"/>
+                  <a:t>We choose to represent our data as a series of conditionals where </a:t>
+                </a:r>
+                <a14:m>
+                  <m:oMath xmlns:m="http://schemas.openxmlformats.org/officeDocument/2006/math">
+                    <m:r>
+                      <a:rPr lang="en-GB" b="0" i="1" smtClean="0">
+                        <a:latin typeface="Cambria Math" panose="02040503050406030204" pitchFamily="18" charset="0"/>
+                      </a:rPr>
+                      <m:t>𝑖</m:t>
+                    </m:r>
+                  </m:oMath>
+                </a14:m>
+                <a:r>
+                  <a:rPr lang="en-GB" b="0" i="1" dirty="0">
+                    <a:latin typeface="Cambria Math" panose="02040503050406030204" pitchFamily="18" charset="0"/>
+                  </a:rPr>
+                  <a:t> </a:t>
+                </a:r>
+                <a:r>
+                  <a:rPr lang="en-GB" b="0" dirty="0">
+                    <a:latin typeface="Cambria Math" panose="02040503050406030204" pitchFamily="18" charset="0"/>
+                  </a:rPr>
+                  <a:t>represents the dimension</a:t>
+                </a:r>
+                <a:endParaRPr lang="en-GB" b="0" i="1" dirty="0">
+                  <a:latin typeface="Cambria Math" panose="02040503050406030204" pitchFamily="18" charset="0"/>
+                </a:endParaRPr>
+              </a:p>
+              <a:p>
+                <a:endParaRPr lang="en-GB" b="0" i="1" dirty="0">
+                  <a:latin typeface="Cambria Math" panose="02040503050406030204" pitchFamily="18" charset="0"/>
+                </a:endParaRPr>
+              </a:p>
+              <a:p>
+                <a:pPr marL="0" indent="0">
+                  <a:buNone/>
+                </a:pPr>
+                <a14:m>
+                  <m:oMathPara xmlns:m="http://schemas.openxmlformats.org/officeDocument/2006/math">
+                    <m:oMathParaPr>
+                      <m:jc m:val="center"/>
+                    </m:oMathParaPr>
+                    <m:oMath xmlns:m="http://schemas.openxmlformats.org/officeDocument/2006/math">
+                      <m:r>
+                        <a:rPr lang="en-GB" b="0" i="1" smtClean="0">
+                          <a:latin typeface="Cambria Math" panose="02040503050406030204" pitchFamily="18" charset="0"/>
+                        </a:rPr>
+                        <m:t>𝑃</m:t>
+                      </m:r>
+                      <m:d>
+                        <m:dPr>
+                          <m:ctrlPr>
+                            <a:rPr lang="en-GB" b="0" i="1" smtClean="0">
+                              <a:latin typeface="Cambria Math" panose="02040503050406030204" pitchFamily="18" charset="0"/>
+                            </a:rPr>
+                          </m:ctrlPr>
+                        </m:dPr>
+                        <m:e>
+                          <m:r>
+                            <a:rPr lang="en-GB" b="0" i="1" smtClean="0">
+                              <a:latin typeface="Cambria Math" panose="02040503050406030204" pitchFamily="18" charset="0"/>
+                            </a:rPr>
+                            <m:t>𝜃</m:t>
+                          </m:r>
+                        </m:e>
+                      </m:d>
+                      <m:r>
+                        <a:rPr lang="en-GB" b="0" i="1" smtClean="0">
+                          <a:latin typeface="Cambria Math" panose="02040503050406030204" pitchFamily="18" charset="0"/>
+                        </a:rPr>
+                        <m:t>=</m:t>
+                      </m:r>
+                      <m:nary>
+                        <m:naryPr>
+                          <m:chr m:val="∏"/>
+                          <m:supHide m:val="on"/>
+                          <m:ctrlPr>
+                            <a:rPr lang="en-GB" b="0" i="1" smtClean="0">
+                              <a:latin typeface="Cambria Math" panose="02040503050406030204" pitchFamily="18" charset="0"/>
+                            </a:rPr>
+                          </m:ctrlPr>
+                        </m:naryPr>
+                        <m:sub>
+                          <m:r>
+                            <a:rPr lang="en-GB" b="0" i="1" smtClean="0">
+                              <a:latin typeface="Cambria Math" panose="02040503050406030204" pitchFamily="18" charset="0"/>
+                            </a:rPr>
+                            <m:t>𝑖</m:t>
+                          </m:r>
+                        </m:sub>
+                        <m:sup/>
+                        <m:e>
+                          <m:r>
+                            <a:rPr lang="en-GB" b="0" i="1" smtClean="0">
+                              <a:latin typeface="Cambria Math" panose="02040503050406030204" pitchFamily="18" charset="0"/>
+                            </a:rPr>
+                            <m:t>𝑃</m:t>
+                          </m:r>
+                          <m:d>
+                            <m:dPr>
+                              <m:endChr m:val="|"/>
+                              <m:ctrlPr>
+                                <a:rPr lang="en-GB" b="0" i="1" smtClean="0">
+                                  <a:latin typeface="Cambria Math" panose="02040503050406030204" pitchFamily="18" charset="0"/>
+                                </a:rPr>
+                              </m:ctrlPr>
+                            </m:dPr>
+                            <m:e>
+                              <m:sSub>
+                                <m:sSubPr>
+                                  <m:ctrlPr>
+                                    <a:rPr lang="en-GB" b="0" i="1" smtClean="0">
+                                      <a:latin typeface="Cambria Math" panose="02040503050406030204" pitchFamily="18" charset="0"/>
+                                    </a:rPr>
+                                  </m:ctrlPr>
+                                </m:sSubPr>
+                                <m:e>
+                                  <m:r>
+                                    <a:rPr lang="en-GB" b="0" i="1" smtClean="0">
+                                      <a:latin typeface="Cambria Math" panose="02040503050406030204" pitchFamily="18" charset="0"/>
+                                    </a:rPr>
+                                    <m:t>𝜃</m:t>
+                                  </m:r>
+                                </m:e>
+                                <m:sub>
+                                  <m:r>
+                                    <a:rPr lang="en-GB" b="0" i="1" smtClean="0">
+                                      <a:latin typeface="Cambria Math" panose="02040503050406030204" pitchFamily="18" charset="0"/>
+                                    </a:rPr>
+                                    <m:t>𝑖</m:t>
+                                  </m:r>
+                                </m:sub>
+                              </m:sSub>
+                            </m:e>
+                          </m:d>
+                          <m:sSub>
+                            <m:sSubPr>
+                              <m:ctrlPr>
+                                <a:rPr lang="en-GB" b="0" i="1" smtClean="0">
+                                  <a:latin typeface="Cambria Math" panose="02040503050406030204" pitchFamily="18" charset="0"/>
+                                </a:rPr>
+                              </m:ctrlPr>
+                            </m:sSubPr>
+                            <m:e>
+                              <m:r>
+                                <a:rPr lang="en-GB" b="0" i="1" smtClean="0">
+                                  <a:latin typeface="Cambria Math" panose="02040503050406030204" pitchFamily="18" charset="0"/>
+                                </a:rPr>
+                                <m:t>𝜃</m:t>
+                              </m:r>
+                            </m:e>
+                            <m:sub>
+                              <m:r>
+                                <a:rPr lang="en-GB" b="0" i="1" smtClean="0">
+                                  <a:latin typeface="Cambria Math" panose="02040503050406030204" pitchFamily="18" charset="0"/>
+                                </a:rPr>
+                                <m:t>0</m:t>
+                              </m:r>
+                            </m:sub>
+                          </m:sSub>
+                          <m:r>
+                            <a:rPr lang="en-GB" b="0" i="1" smtClean="0">
+                              <a:latin typeface="Cambria Math" panose="02040503050406030204" pitchFamily="18" charset="0"/>
+                            </a:rPr>
+                            <m:t>,</m:t>
+                          </m:r>
+                          <m:sSub>
+                            <m:sSubPr>
+                              <m:ctrlPr>
+                                <a:rPr lang="en-GB" b="0" i="1" smtClean="0">
+                                  <a:latin typeface="Cambria Math" panose="02040503050406030204" pitchFamily="18" charset="0"/>
+                                </a:rPr>
+                              </m:ctrlPr>
+                            </m:sSubPr>
+                            <m:e>
+                              <m:r>
+                                <a:rPr lang="en-GB" b="0" i="1" smtClean="0">
+                                  <a:latin typeface="Cambria Math" panose="02040503050406030204" pitchFamily="18" charset="0"/>
+                                </a:rPr>
+                                <m:t>𝜃</m:t>
+                              </m:r>
+                            </m:e>
+                            <m:sub>
+                              <m:r>
+                                <a:rPr lang="en-GB" b="0" i="1" smtClean="0">
+                                  <a:latin typeface="Cambria Math" panose="02040503050406030204" pitchFamily="18" charset="0"/>
+                                </a:rPr>
+                                <m:t>1</m:t>
+                              </m:r>
+                            </m:sub>
+                          </m:sSub>
+                          <m:r>
+                            <a:rPr lang="en-GB" b="0" i="1" smtClean="0">
+                              <a:latin typeface="Cambria Math" panose="02040503050406030204" pitchFamily="18" charset="0"/>
+                            </a:rPr>
+                            <m:t>,…</m:t>
+                          </m:r>
+                          <m:sSub>
+                            <m:sSubPr>
+                              <m:ctrlPr>
+                                <a:rPr lang="en-GB" b="0" i="1" smtClean="0">
+                                  <a:latin typeface="Cambria Math" panose="02040503050406030204" pitchFamily="18" charset="0"/>
+                                </a:rPr>
+                              </m:ctrlPr>
+                            </m:sSubPr>
+                            <m:e>
+                              <m:r>
+                                <a:rPr lang="en-GB" b="0" i="1" smtClean="0">
+                                  <a:latin typeface="Cambria Math" panose="02040503050406030204" pitchFamily="18" charset="0"/>
+                                </a:rPr>
+                                <m:t>𝜃</m:t>
+                              </m:r>
+                            </m:e>
+                            <m:sub>
+                              <m:r>
+                                <a:rPr lang="en-GB" b="0" i="1" smtClean="0">
+                                  <a:latin typeface="Cambria Math" panose="02040503050406030204" pitchFamily="18" charset="0"/>
+                                </a:rPr>
+                                <m:t>𝑖</m:t>
+                              </m:r>
+                              <m:r>
+                                <a:rPr lang="en-GB" b="0" i="1" smtClean="0">
+                                  <a:latin typeface="Cambria Math" panose="02040503050406030204" pitchFamily="18" charset="0"/>
+                                </a:rPr>
+                                <m:t>−1</m:t>
+                              </m:r>
+                            </m:sub>
+                          </m:sSub>
+                          <m:r>
+                            <a:rPr lang="en-GB" b="0" i="1" smtClean="0">
+                              <a:latin typeface="Cambria Math" panose="02040503050406030204" pitchFamily="18" charset="0"/>
+                            </a:rPr>
+                            <m:t>)</m:t>
+                          </m:r>
+                        </m:e>
+                      </m:nary>
+                    </m:oMath>
+                  </m:oMathPara>
+                </a14:m>
+                <a:endParaRPr lang="en-GB" b="0" dirty="0"/>
+              </a:p>
+              <a:p>
+                <a:endParaRPr lang="en-GB" dirty="0"/>
+              </a:p>
+              <a:p>
+                <a:r>
+                  <a:rPr lang="en-GB" dirty="0"/>
+                  <a:t>And model each conditional as a Gaussian distribution</a:t>
+                </a:r>
+                <a:r>
+                  <a:rPr lang="en-GB" b="0" dirty="0"/>
+                  <a:t> </a:t>
+                </a:r>
+              </a:p>
+              <a:p>
+                <a:endParaRPr lang="en-GB" b="0" dirty="0"/>
+              </a:p>
+              <a:p>
+                <a:pPr marL="0" indent="0">
+                  <a:buNone/>
+                </a:pPr>
+                <a14:m>
+                  <m:oMathPara xmlns:m="http://schemas.openxmlformats.org/officeDocument/2006/math">
+                    <m:oMathParaPr>
+                      <m:jc m:val="center"/>
+                    </m:oMathParaPr>
+                    <m:oMath xmlns:m="http://schemas.openxmlformats.org/officeDocument/2006/math">
+                      <m:r>
+                        <a:rPr lang="en-GB" b="0" i="1" smtClean="0">
+                          <a:latin typeface="Cambria Math" panose="02040503050406030204" pitchFamily="18" charset="0"/>
+                        </a:rPr>
+                        <m:t>𝑃</m:t>
+                      </m:r>
+                      <m:d>
+                        <m:dPr>
+                          <m:endChr m:val="|"/>
+                          <m:ctrlPr>
+                            <a:rPr lang="en-GB" b="0" i="1" smtClean="0">
+                              <a:latin typeface="Cambria Math" panose="02040503050406030204" pitchFamily="18" charset="0"/>
+                            </a:rPr>
+                          </m:ctrlPr>
+                        </m:dPr>
+                        <m:e>
+                          <m:sSub>
+                            <m:sSubPr>
+                              <m:ctrlPr>
+                                <a:rPr lang="en-GB" b="0" i="1" smtClean="0">
+                                  <a:latin typeface="Cambria Math" panose="02040503050406030204" pitchFamily="18" charset="0"/>
+                                </a:rPr>
+                              </m:ctrlPr>
+                            </m:sSubPr>
+                            <m:e>
+                              <m:r>
+                                <a:rPr lang="en-GB" b="0" i="1" smtClean="0">
+                                  <a:latin typeface="Cambria Math" panose="02040503050406030204" pitchFamily="18" charset="0"/>
+                                </a:rPr>
+                                <m:t>𝜃</m:t>
+                              </m:r>
+                            </m:e>
+                            <m:sub>
+                              <m:r>
+                                <a:rPr lang="en-GB" b="0" i="1" smtClean="0">
+                                  <a:latin typeface="Cambria Math" panose="02040503050406030204" pitchFamily="18" charset="0"/>
+                                </a:rPr>
+                                <m:t>𝑖</m:t>
+                              </m:r>
+                            </m:sub>
+                          </m:sSub>
+                        </m:e>
+                      </m:d>
+                      <m:sSub>
+                        <m:sSubPr>
+                          <m:ctrlPr>
+                            <a:rPr lang="en-GB" b="0" i="1" smtClean="0">
+                              <a:latin typeface="Cambria Math" panose="02040503050406030204" pitchFamily="18" charset="0"/>
+                            </a:rPr>
+                          </m:ctrlPr>
+                        </m:sSubPr>
+                        <m:e>
+                          <m:r>
+                            <a:rPr lang="en-GB" b="0" i="1" smtClean="0">
+                              <a:latin typeface="Cambria Math" panose="02040503050406030204" pitchFamily="18" charset="0"/>
+                            </a:rPr>
+                            <m:t>𝜃</m:t>
+                          </m:r>
+                        </m:e>
+                        <m:sub>
+                          <m:r>
+                            <a:rPr lang="en-GB" b="0" i="1" smtClean="0">
+                              <a:latin typeface="Cambria Math" panose="02040503050406030204" pitchFamily="18" charset="0"/>
+                            </a:rPr>
+                            <m:t>0</m:t>
+                          </m:r>
+                        </m:sub>
+                      </m:sSub>
+                      <m:r>
+                        <a:rPr lang="en-GB" b="0" i="1" smtClean="0">
+                          <a:latin typeface="Cambria Math" panose="02040503050406030204" pitchFamily="18" charset="0"/>
+                        </a:rPr>
+                        <m:t>,</m:t>
+                      </m:r>
+                      <m:sSub>
+                        <m:sSubPr>
+                          <m:ctrlPr>
+                            <a:rPr lang="en-GB" b="0" i="1" smtClean="0">
+                              <a:latin typeface="Cambria Math" panose="02040503050406030204" pitchFamily="18" charset="0"/>
+                            </a:rPr>
+                          </m:ctrlPr>
+                        </m:sSubPr>
+                        <m:e>
+                          <m:r>
+                            <a:rPr lang="en-GB" b="0" i="1" smtClean="0">
+                              <a:latin typeface="Cambria Math" panose="02040503050406030204" pitchFamily="18" charset="0"/>
+                            </a:rPr>
+                            <m:t>𝜃</m:t>
+                          </m:r>
+                        </m:e>
+                        <m:sub>
+                          <m:r>
+                            <a:rPr lang="en-GB" b="0" i="1" smtClean="0">
+                              <a:latin typeface="Cambria Math" panose="02040503050406030204" pitchFamily="18" charset="0"/>
+                            </a:rPr>
+                            <m:t>1</m:t>
+                          </m:r>
+                        </m:sub>
+                      </m:sSub>
+                      <m:r>
+                        <a:rPr lang="en-GB" b="0" i="1" smtClean="0">
+                          <a:latin typeface="Cambria Math" panose="02040503050406030204" pitchFamily="18" charset="0"/>
+                        </a:rPr>
+                        <m:t>,…</m:t>
+                      </m:r>
+                      <m:sSub>
+                        <m:sSubPr>
+                          <m:ctrlPr>
+                            <a:rPr lang="en-GB" b="0" i="1" smtClean="0">
+                              <a:latin typeface="Cambria Math" panose="02040503050406030204" pitchFamily="18" charset="0"/>
+                            </a:rPr>
+                          </m:ctrlPr>
+                        </m:sSubPr>
+                        <m:e>
+                          <m:r>
+                            <a:rPr lang="en-GB" b="0" i="1" smtClean="0">
+                              <a:latin typeface="Cambria Math" panose="02040503050406030204" pitchFamily="18" charset="0"/>
+                            </a:rPr>
+                            <m:t>𝜃</m:t>
+                          </m:r>
+                        </m:e>
+                        <m:sub>
+                          <m:r>
+                            <a:rPr lang="en-GB" b="0" i="1" smtClean="0">
+                              <a:latin typeface="Cambria Math" panose="02040503050406030204" pitchFamily="18" charset="0"/>
+                            </a:rPr>
+                            <m:t>𝑖</m:t>
+                          </m:r>
+                          <m:r>
+                            <a:rPr lang="en-GB" b="0" i="1" smtClean="0">
+                              <a:latin typeface="Cambria Math" panose="02040503050406030204" pitchFamily="18" charset="0"/>
+                            </a:rPr>
+                            <m:t>−1</m:t>
+                          </m:r>
+                        </m:sub>
+                      </m:sSub>
+                      <m:r>
+                        <a:rPr lang="en-GB" b="0" i="1" smtClean="0">
+                          <a:latin typeface="Cambria Math" panose="02040503050406030204" pitchFamily="18" charset="0"/>
+                        </a:rPr>
+                        <m:t>)</m:t>
+                      </m:r>
+                      <m:r>
+                        <a:rPr lang="en-GB" b="0" i="1" smtClean="0">
+                          <a:latin typeface="Cambria Math" panose="02040503050406030204" pitchFamily="18" charset="0"/>
+                        </a:rPr>
+                        <m:t>=</m:t>
+                      </m:r>
+                      <m:r>
+                        <a:rPr lang="en-GB" b="0" i="1" smtClean="0">
+                          <a:latin typeface="Cambria Math" panose="02040503050406030204" pitchFamily="18" charset="0"/>
+                        </a:rPr>
+                        <m:t>𝑁</m:t>
+                      </m:r>
+                      <m:r>
+                        <a:rPr lang="en-GB" b="0" i="1" smtClean="0">
+                          <a:latin typeface="Cambria Math" panose="02040503050406030204" pitchFamily="18" charset="0"/>
+                        </a:rPr>
+                        <m:t>(</m:t>
+                      </m:r>
+                      <m:sSub>
+                        <m:sSubPr>
+                          <m:ctrlPr>
+                            <a:rPr lang="en-GB" b="0" i="1" smtClean="0">
+                              <a:latin typeface="Cambria Math" panose="02040503050406030204" pitchFamily="18" charset="0"/>
+                            </a:rPr>
+                          </m:ctrlPr>
+                        </m:sSubPr>
+                        <m:e>
+                          <m:r>
+                            <a:rPr lang="en-GB" b="0" i="1" smtClean="0">
+                              <a:latin typeface="Cambria Math" panose="02040503050406030204" pitchFamily="18" charset="0"/>
+                            </a:rPr>
+                            <m:t>𝜇</m:t>
+                          </m:r>
+                        </m:e>
+                        <m:sub>
+                          <m:r>
+                            <a:rPr lang="en-GB" b="0" i="1" smtClean="0">
+                              <a:latin typeface="Cambria Math" panose="02040503050406030204" pitchFamily="18" charset="0"/>
+                            </a:rPr>
+                            <m:t>𝑖</m:t>
+                          </m:r>
+                        </m:sub>
+                      </m:sSub>
+                      <m:r>
+                        <a:rPr lang="en-GB" b="0" i="1" smtClean="0">
+                          <a:latin typeface="Cambria Math" panose="02040503050406030204" pitchFamily="18" charset="0"/>
+                        </a:rPr>
+                        <m:t>,</m:t>
+                      </m:r>
+                      <m:sSub>
+                        <m:sSubPr>
+                          <m:ctrlPr>
+                            <a:rPr lang="en-GB" b="0" i="1" smtClean="0">
+                              <a:latin typeface="Cambria Math" panose="02040503050406030204" pitchFamily="18" charset="0"/>
+                            </a:rPr>
+                          </m:ctrlPr>
+                        </m:sSubPr>
+                        <m:e>
+                          <m:r>
+                            <a:rPr lang="en-GB" b="0" i="1" smtClean="0">
+                              <a:latin typeface="Cambria Math" panose="02040503050406030204" pitchFamily="18" charset="0"/>
+                            </a:rPr>
+                            <m:t>𝜎</m:t>
+                          </m:r>
+                        </m:e>
+                        <m:sub>
+                          <m:r>
+                            <a:rPr lang="en-GB" b="0" i="1" smtClean="0">
+                              <a:latin typeface="Cambria Math" panose="02040503050406030204" pitchFamily="18" charset="0"/>
+                            </a:rPr>
+                            <m:t>𝑖</m:t>
+                          </m:r>
+                        </m:sub>
+                      </m:sSub>
+                      <m:r>
+                        <a:rPr lang="en-GB" b="0" i="1" smtClean="0">
+                          <a:latin typeface="Cambria Math" panose="02040503050406030204" pitchFamily="18" charset="0"/>
+                        </a:rPr>
+                        <m:t>) </m:t>
+                      </m:r>
+                    </m:oMath>
+                  </m:oMathPara>
+                </a14:m>
+                <a:endParaRPr lang="en-GB" b="0" dirty="0"/>
+              </a:p>
+              <a:p>
+                <a:pPr marL="0" indent="0">
+                  <a:buNone/>
+                </a:pPr>
+                <a:r>
+                  <a:rPr lang="en-GB" dirty="0">
+                    <a:solidFill>
+                      <a:srgbClr val="FF0000"/>
+                    </a:solidFill>
+                  </a:rPr>
+                  <a:t>…. More here </a:t>
+                </a:r>
+                <a:endParaRPr lang="en-GB" b="0" dirty="0">
+                  <a:solidFill>
+                    <a:srgbClr val="FF0000"/>
+                  </a:solidFill>
+                </a:endParaRPr>
+              </a:p>
+              <a:p>
+                <a:endParaRPr lang="en-GB" dirty="0"/>
+              </a:p>
+            </p:txBody>
+          </p:sp>
+        </mc:Choice>
+        <mc:Fallback>
+          <p:sp>
+            <p:nvSpPr>
+              <p:cNvPr id="3" name="Content Placeholder 2">
+                <a:extLst>
+                  <a:ext uri="{FF2B5EF4-FFF2-40B4-BE49-F238E27FC236}">
+                    <a16:creationId xmlns:a16="http://schemas.microsoft.com/office/drawing/2014/main" id="{E8875089-E0CA-BAAB-8119-D759BDD7DFD5}"/>
+                  </a:ext>
+                </a:extLst>
+              </p:cNvPr>
+              <p:cNvSpPr>
+                <a:spLocks noGrp="1" noRot="1" noChangeAspect="1" noMove="1" noResize="1" noEditPoints="1" noAdjustHandles="1" noChangeArrowheads="1" noChangeShapeType="1" noTextEdit="1"/>
+              </p:cNvSpPr>
+              <p:nvPr>
+                <p:ph idx="1"/>
+              </p:nvPr>
+            </p:nvSpPr>
+            <p:spPr>
+              <a:xfrm>
+                <a:off x="838200" y="1614009"/>
+                <a:ext cx="10054820" cy="4562954"/>
+              </a:xfrm>
+              <a:blipFill>
+                <a:blip r:embed="rId2"/>
+                <a:stretch>
+                  <a:fillRect l="-1263" t="-9444" r="-884" b="-1111"/>
+                </a:stretch>
+              </a:blipFill>
+            </p:spPr>
+            <p:txBody>
+              <a:bodyPr/>
+              <a:lstStyle/>
+              <a:p>
+                <a:r>
+                  <a:rPr lang="en-US">
+                    <a:noFill/>
+                  </a:rPr>
+                  <a:t> </a:t>
+                </a:r>
+              </a:p>
+            </p:txBody>
+          </p:sp>
+        </mc:Fallback>
+      </mc:AlternateContent>
+    </p:spTree>
+    <p:extLst>
+      <p:ext uri="{BB962C8B-B14F-4D97-AF65-F5344CB8AC3E}">
+        <p14:creationId xmlns:p14="http://schemas.microsoft.com/office/powerpoint/2010/main" val="701987632"/>
+      </p:ext>
+    </p:extLst>
+  </p:cSld>
+  <p:clrMapOvr>
+    <a:masterClrMapping/>
+  </p:clrMapOvr>
+</p:sld>
+</file>
+
+<file path=ppt/slides/slide22.xml><?xml version="1.0" encoding="utf-8"?>
+<p:sld xmlns:a="http://schemas.openxmlformats.org/drawingml/2006/main" xmlns:r="http://schemas.openxmlformats.org/officeDocument/2006/relationships" xmlns:p="http://schemas.openxmlformats.org/presentationml/2006/main">
+  <p:cSld>
+    <p:spTree>
+      <p:nvGrpSpPr>
+        <p:cNvPr id="1" name=""/>
+        <p:cNvGrpSpPr/>
+        <p:nvPr/>
+      </p:nvGrpSpPr>
+      <p:grpSpPr>
+        <a:xfrm>
+          <a:off x="0" y="0"/>
+          <a:ext cx="0" cy="0"/>
+          <a:chOff x="0" y="0"/>
+          <a:chExt cx="0" cy="0"/>
+        </a:xfrm>
+      </p:grpSpPr>
+      <p:sp>
+        <p:nvSpPr>
+          <p:cNvPr id="2" name="Title 1">
+            <a:extLst>
+              <a:ext uri="{FF2B5EF4-FFF2-40B4-BE49-F238E27FC236}">
+                <a16:creationId xmlns:a16="http://schemas.microsoft.com/office/drawing/2014/main" id="{BA657AB3-EDFB-007E-B0AC-C4711988CC5E}"/>
+              </a:ext>
+            </a:extLst>
+          </p:cNvPr>
+          <p:cNvSpPr>
+            <a:spLocks noGrp="1"/>
+          </p:cNvSpPr>
+          <p:nvPr>
+            <p:ph type="title"/>
+          </p:nvPr>
+        </p:nvSpPr>
+        <p:spPr/>
+        <p:txBody>
+          <a:bodyPr/>
+          <a:lstStyle/>
+          <a:p>
+            <a:r>
+              <a:rPr lang="en-US" dirty="0">
+                <a:solidFill>
+                  <a:srgbClr val="C00000"/>
+                </a:solidFill>
+              </a:rPr>
+              <a:t>MADE</a:t>
+            </a:r>
+          </a:p>
+        </p:txBody>
+      </p:sp>
+      <p:sp>
+        <p:nvSpPr>
+          <p:cNvPr id="4" name="Footer Placeholder 3">
+            <a:extLst>
+              <a:ext uri="{FF2B5EF4-FFF2-40B4-BE49-F238E27FC236}">
+                <a16:creationId xmlns:a16="http://schemas.microsoft.com/office/drawing/2014/main" id="{5B37B85D-4118-2515-D53D-475C4E66C472}"/>
+              </a:ext>
+            </a:extLst>
+          </p:cNvPr>
+          <p:cNvSpPr>
+            <a:spLocks noGrp="1"/>
+          </p:cNvSpPr>
+          <p:nvPr>
+            <p:ph type="ftr" sz="quarter" idx="11"/>
+          </p:nvPr>
+        </p:nvSpPr>
+        <p:spPr/>
+        <p:txBody>
+          <a:bodyPr/>
+          <a:lstStyle/>
+          <a:p>
+            <a:r>
+              <a:rPr lang="en-US"/>
+              <a:t>MPhil in DIS - Data Driven Radio Astronomy in the SKA era</a:t>
+            </a:r>
+          </a:p>
+        </p:txBody>
+      </p:sp>
+      <p:sp>
+        <p:nvSpPr>
+          <p:cNvPr id="5" name="Slide Number Placeholder 4">
+            <a:extLst>
+              <a:ext uri="{FF2B5EF4-FFF2-40B4-BE49-F238E27FC236}">
+                <a16:creationId xmlns:a16="http://schemas.microsoft.com/office/drawing/2014/main" id="{DF1CED66-178C-490A-3189-D188E2783F5F}"/>
+              </a:ext>
+            </a:extLst>
+          </p:cNvPr>
+          <p:cNvSpPr>
+            <a:spLocks noGrp="1"/>
+          </p:cNvSpPr>
+          <p:nvPr>
+            <p:ph type="sldNum" sz="quarter" idx="12"/>
+          </p:nvPr>
+        </p:nvSpPr>
+        <p:spPr/>
+        <p:txBody>
+          <a:bodyPr/>
+          <a:lstStyle/>
+          <a:p>
+            <a:fld id="{9AA976C4-0B8A-7C44-883E-604AFF758C0B}" type="slidenum">
+              <a:rPr lang="en-US" smtClean="0"/>
+              <a:t>22</a:t>
+            </a:fld>
+            <a:endParaRPr lang="en-US"/>
+          </a:p>
+        </p:txBody>
+      </p:sp>
+      <p:sp>
+        <p:nvSpPr>
+          <p:cNvPr id="6" name="Date Placeholder 5">
+            <a:extLst>
+              <a:ext uri="{FF2B5EF4-FFF2-40B4-BE49-F238E27FC236}">
+                <a16:creationId xmlns:a16="http://schemas.microsoft.com/office/drawing/2014/main" id="{4E6B5B9F-EDA9-548A-4004-336F2CE389B6}"/>
+              </a:ext>
+            </a:extLst>
+          </p:cNvPr>
+          <p:cNvSpPr>
+            <a:spLocks noGrp="1"/>
+          </p:cNvSpPr>
+          <p:nvPr>
+            <p:ph type="dt" sz="half" idx="10"/>
+          </p:nvPr>
+        </p:nvSpPr>
+        <p:spPr/>
+        <p:txBody>
+          <a:bodyPr/>
+          <a:lstStyle/>
+          <a:p>
+            <a:r>
+              <a:rPr lang="en-GB"/>
+              <a:t>2024</a:t>
+            </a:r>
+            <a:endParaRPr lang="en-US"/>
+          </a:p>
+        </p:txBody>
+      </p:sp>
+      <p:sp>
+        <p:nvSpPr>
+          <p:cNvPr id="7" name="TextBox 6">
+            <a:extLst>
+              <a:ext uri="{FF2B5EF4-FFF2-40B4-BE49-F238E27FC236}">
+                <a16:creationId xmlns:a16="http://schemas.microsoft.com/office/drawing/2014/main" id="{BF747AB1-4674-B7BC-3F75-4F680DC871D7}"/>
+              </a:ext>
+            </a:extLst>
+          </p:cNvPr>
+          <p:cNvSpPr txBox="1"/>
+          <p:nvPr/>
+        </p:nvSpPr>
+        <p:spPr>
+          <a:xfrm>
+            <a:off x="8965870" y="5676406"/>
+            <a:ext cx="1774075" cy="369332"/>
+          </a:xfrm>
+          <a:prstGeom prst="rect">
+            <a:avLst/>
+          </a:prstGeom>
+          <a:noFill/>
+        </p:spPr>
+        <p:txBody>
+          <a:bodyPr wrap="none" rtlCol="0">
+            <a:spAutoFit/>
+          </a:bodyPr>
+          <a:lstStyle/>
+          <a:p>
+            <a:r>
+              <a:rPr lang="en-US" dirty="0">
+                <a:hlinkClick r:id="rId2"/>
+              </a:rPr>
+              <a:t>Bevins et al 2023</a:t>
+            </a:r>
+            <a:endParaRPr lang="en-US" dirty="0"/>
+          </a:p>
+        </p:txBody>
+      </p:sp>
+      <p:grpSp>
+        <p:nvGrpSpPr>
+          <p:cNvPr id="11" name="Group 10">
+            <a:extLst>
+              <a:ext uri="{FF2B5EF4-FFF2-40B4-BE49-F238E27FC236}">
+                <a16:creationId xmlns:a16="http://schemas.microsoft.com/office/drawing/2014/main" id="{9D9E77DB-E8CF-FB12-CFE0-9ADE52B522E0}"/>
+              </a:ext>
+            </a:extLst>
+          </p:cNvPr>
+          <p:cNvGrpSpPr/>
+          <p:nvPr/>
+        </p:nvGrpSpPr>
+        <p:grpSpPr>
+          <a:xfrm>
+            <a:off x="2964672" y="1196845"/>
+            <a:ext cx="6262655" cy="4479561"/>
+            <a:chOff x="2964672" y="1196845"/>
+            <a:chExt cx="6262655" cy="4479561"/>
+          </a:xfrm>
+        </p:grpSpPr>
+        <p:pic>
+          <p:nvPicPr>
+            <p:cNvPr id="9" name="Picture 8">
+              <a:extLst>
+                <a:ext uri="{FF2B5EF4-FFF2-40B4-BE49-F238E27FC236}">
+                  <a16:creationId xmlns:a16="http://schemas.microsoft.com/office/drawing/2014/main" id="{0B488B3A-7FE5-8518-2C9F-8CB5B8D777EC}"/>
+                </a:ext>
+              </a:extLst>
+            </p:cNvPr>
+            <p:cNvPicPr>
+              <a:picLocks noChangeAspect="1"/>
+            </p:cNvPicPr>
+            <p:nvPr/>
+          </p:nvPicPr>
+          <p:blipFill>
+            <a:blip r:embed="rId3"/>
+            <a:stretch>
+              <a:fillRect/>
+            </a:stretch>
+          </p:blipFill>
+          <p:spPr>
+            <a:xfrm>
+              <a:off x="2964672" y="1196845"/>
+              <a:ext cx="6262655" cy="4464310"/>
+            </a:xfrm>
+            <a:prstGeom prst="rect">
+              <a:avLst/>
+            </a:prstGeom>
+          </p:spPr>
+        </p:pic>
+        <p:sp>
+          <p:nvSpPr>
+            <p:cNvPr id="10" name="Rectangle 9">
+              <a:extLst>
+                <a:ext uri="{FF2B5EF4-FFF2-40B4-BE49-F238E27FC236}">
+                  <a16:creationId xmlns:a16="http://schemas.microsoft.com/office/drawing/2014/main" id="{9B27A8DB-7359-DD62-33B0-BF27D523FCB5}"/>
+                </a:ext>
+              </a:extLst>
+            </p:cNvPr>
+            <p:cNvSpPr/>
+            <p:nvPr/>
+          </p:nvSpPr>
+          <p:spPr>
+            <a:xfrm>
+              <a:off x="3892731" y="4872446"/>
+              <a:ext cx="1384663" cy="803960"/>
+            </a:xfrm>
+            <a:prstGeom prst="rect">
+              <a:avLst/>
+            </a:prstGeom>
+            <a:ln>
+              <a:noFill/>
+            </a:ln>
+          </p:spPr>
+          <p:style>
+            <a:lnRef idx="2">
+              <a:schemeClr val="accent6"/>
+            </a:lnRef>
+            <a:fillRef idx="1">
+              <a:schemeClr val="lt1"/>
+            </a:fillRef>
+            <a:effectRef idx="0">
+              <a:schemeClr val="accent6"/>
+            </a:effectRef>
+            <a:fontRef idx="minor">
+              <a:schemeClr val="dk1"/>
+            </a:fontRef>
+          </p:style>
+          <p:txBody>
+            <a:bodyPr rtlCol="0" anchor="ctr"/>
+            <a:lstStyle/>
+            <a:p>
+              <a:pPr algn="ctr"/>
+              <a:endParaRPr lang="en-US"/>
+            </a:p>
+          </p:txBody>
+        </p:sp>
+      </p:grpSp>
+    </p:spTree>
+    <p:extLst>
+      <p:ext uri="{BB962C8B-B14F-4D97-AF65-F5344CB8AC3E}">
+        <p14:creationId xmlns:p14="http://schemas.microsoft.com/office/powerpoint/2010/main" val="1531818972"/>
+      </p:ext>
+    </p:extLst>
+  </p:cSld>
+  <p:clrMapOvr>
+    <a:masterClrMapping/>
+  </p:clrMapOvr>
+</p:sld>
+</file>
+
+<file path=ppt/slides/slide23.xml><?xml version="1.0" encoding="utf-8"?>
+<p:sld xmlns:a="http://schemas.openxmlformats.org/drawingml/2006/main" xmlns:r="http://schemas.openxmlformats.org/officeDocument/2006/relationships" xmlns:p="http://schemas.openxmlformats.org/presentationml/2006/main">
+  <p:cSld>
+    <p:spTree>
+      <p:nvGrpSpPr>
+        <p:cNvPr id="1" name=""/>
+        <p:cNvGrpSpPr/>
+        <p:nvPr/>
+      </p:nvGrpSpPr>
+      <p:grpSpPr>
+        <a:xfrm>
+          <a:off x="0" y="0"/>
+          <a:ext cx="0" cy="0"/>
+          <a:chOff x="0" y="0"/>
+          <a:chExt cx="0" cy="0"/>
+        </a:xfrm>
+      </p:grpSpPr>
+      <p:sp>
+        <p:nvSpPr>
+          <p:cNvPr id="2" name="Title 1">
+            <a:extLst>
+              <a:ext uri="{FF2B5EF4-FFF2-40B4-BE49-F238E27FC236}">
+                <a16:creationId xmlns:a16="http://schemas.microsoft.com/office/drawing/2014/main" id="{BA657AB3-EDFB-007E-B0AC-C4711988CC5E}"/>
+              </a:ext>
+            </a:extLst>
+          </p:cNvPr>
+          <p:cNvSpPr>
+            <a:spLocks noGrp="1"/>
+          </p:cNvSpPr>
+          <p:nvPr>
+            <p:ph type="title"/>
+          </p:nvPr>
+        </p:nvSpPr>
         <p:spPr>
           <a:xfrm>
             <a:off x="838200" y="2766218"/>
@@ -7715,7 +8791,7 @@
           <a:p>
             <a:fld id="{9AA976C4-0B8A-7C44-883E-604AFF758C0B}" type="slidenum">
               <a:rPr lang="en-US" smtClean="0"/>
-              <a:t>21</a:t>
+              <a:t>23</a:t>
             </a:fld>
             <a:endParaRPr lang="en-US"/>
           </a:p>
@@ -7754,6 +8830,1928 @@
     <p:extLst>
       <p:ext uri="{BB962C8B-B14F-4D97-AF65-F5344CB8AC3E}">
         <p14:creationId xmlns:p14="http://schemas.microsoft.com/office/powerpoint/2010/main" val="2543476824"/>
+      </p:ext>
+    </p:extLst>
+  </p:cSld>
+  <p:clrMapOvr>
+    <a:masterClrMapping/>
+  </p:clrMapOvr>
+</p:sld>
+</file>
+
+<file path=ppt/slides/slide24.xml><?xml version="1.0" encoding="utf-8"?>
+<p:sld xmlns:a="http://schemas.openxmlformats.org/drawingml/2006/main" xmlns:r="http://schemas.openxmlformats.org/officeDocument/2006/relationships" xmlns:p="http://schemas.openxmlformats.org/presentationml/2006/main">
+  <p:cSld>
+    <p:spTree>
+      <p:nvGrpSpPr>
+        <p:cNvPr id="1" name=""/>
+        <p:cNvGrpSpPr/>
+        <p:nvPr/>
+      </p:nvGrpSpPr>
+      <p:grpSpPr>
+        <a:xfrm>
+          <a:off x="0" y="0"/>
+          <a:ext cx="0" cy="0"/>
+          <a:chOff x="0" y="0"/>
+          <a:chExt cx="0" cy="0"/>
+        </a:xfrm>
+      </p:grpSpPr>
+      <p:sp>
+        <p:nvSpPr>
+          <p:cNvPr id="2" name="Title 1">
+            <a:extLst>
+              <a:ext uri="{FF2B5EF4-FFF2-40B4-BE49-F238E27FC236}">
+                <a16:creationId xmlns:a16="http://schemas.microsoft.com/office/drawing/2014/main" id="{BA657AB3-EDFB-007E-B0AC-C4711988CC5E}"/>
+              </a:ext>
+            </a:extLst>
+          </p:cNvPr>
+          <p:cNvSpPr>
+            <a:spLocks noGrp="1"/>
+          </p:cNvSpPr>
+          <p:nvPr>
+            <p:ph type="title"/>
+          </p:nvPr>
+        </p:nvSpPr>
+        <p:spPr/>
+        <p:txBody>
+          <a:bodyPr/>
+          <a:lstStyle/>
+          <a:p>
+            <a:r>
+              <a:rPr lang="en-US" dirty="0">
+                <a:solidFill>
+                  <a:srgbClr val="C00000"/>
+                </a:solidFill>
+              </a:rPr>
+              <a:t>What is NRE?</a:t>
+            </a:r>
+          </a:p>
+        </p:txBody>
+      </p:sp>
+      <p:sp>
+        <p:nvSpPr>
+          <p:cNvPr id="4" name="Footer Placeholder 3">
+            <a:extLst>
+              <a:ext uri="{FF2B5EF4-FFF2-40B4-BE49-F238E27FC236}">
+                <a16:creationId xmlns:a16="http://schemas.microsoft.com/office/drawing/2014/main" id="{5B37B85D-4118-2515-D53D-475C4E66C472}"/>
+              </a:ext>
+            </a:extLst>
+          </p:cNvPr>
+          <p:cNvSpPr>
+            <a:spLocks noGrp="1"/>
+          </p:cNvSpPr>
+          <p:nvPr>
+            <p:ph type="ftr" sz="quarter" idx="11"/>
+          </p:nvPr>
+        </p:nvSpPr>
+        <p:spPr/>
+        <p:txBody>
+          <a:bodyPr/>
+          <a:lstStyle/>
+          <a:p>
+            <a:r>
+              <a:rPr lang="en-US"/>
+              <a:t>MPhil in DIS - Data Driven Radio Astronomy in the SKA era</a:t>
+            </a:r>
+          </a:p>
+        </p:txBody>
+      </p:sp>
+      <p:sp>
+        <p:nvSpPr>
+          <p:cNvPr id="5" name="Slide Number Placeholder 4">
+            <a:extLst>
+              <a:ext uri="{FF2B5EF4-FFF2-40B4-BE49-F238E27FC236}">
+                <a16:creationId xmlns:a16="http://schemas.microsoft.com/office/drawing/2014/main" id="{DF1CED66-178C-490A-3189-D188E2783F5F}"/>
+              </a:ext>
+            </a:extLst>
+          </p:cNvPr>
+          <p:cNvSpPr>
+            <a:spLocks noGrp="1"/>
+          </p:cNvSpPr>
+          <p:nvPr>
+            <p:ph type="sldNum" sz="quarter" idx="12"/>
+          </p:nvPr>
+        </p:nvSpPr>
+        <p:spPr/>
+        <p:txBody>
+          <a:bodyPr/>
+          <a:lstStyle/>
+          <a:p>
+            <a:fld id="{9AA976C4-0B8A-7C44-883E-604AFF758C0B}" type="slidenum">
+              <a:rPr lang="en-US" smtClean="0"/>
+              <a:t>24</a:t>
+            </a:fld>
+            <a:endParaRPr lang="en-US"/>
+          </a:p>
+        </p:txBody>
+      </p:sp>
+      <p:sp>
+        <p:nvSpPr>
+          <p:cNvPr id="6" name="Date Placeholder 5">
+            <a:extLst>
+              <a:ext uri="{FF2B5EF4-FFF2-40B4-BE49-F238E27FC236}">
+                <a16:creationId xmlns:a16="http://schemas.microsoft.com/office/drawing/2014/main" id="{4E6B5B9F-EDA9-548A-4004-336F2CE389B6}"/>
+              </a:ext>
+            </a:extLst>
+          </p:cNvPr>
+          <p:cNvSpPr>
+            <a:spLocks noGrp="1"/>
+          </p:cNvSpPr>
+          <p:nvPr>
+            <p:ph type="dt" sz="half" idx="10"/>
+          </p:nvPr>
+        </p:nvSpPr>
+        <p:spPr/>
+        <p:txBody>
+          <a:bodyPr/>
+          <a:lstStyle/>
+          <a:p>
+            <a:r>
+              <a:rPr lang="en-GB"/>
+              <a:t>2024</a:t>
+            </a:r>
+            <a:endParaRPr lang="en-US"/>
+          </a:p>
+        </p:txBody>
+      </p:sp>
+      <mc:AlternateContent xmlns:mc="http://schemas.openxmlformats.org/markup-compatibility/2006">
+        <mc:Choice xmlns:a14="http://schemas.microsoft.com/office/drawing/2010/main" Requires="a14">
+          <p:sp>
+            <p:nvSpPr>
+              <p:cNvPr id="3" name="Content Placeholder 2">
+                <a:extLst>
+                  <a:ext uri="{FF2B5EF4-FFF2-40B4-BE49-F238E27FC236}">
+                    <a16:creationId xmlns:a16="http://schemas.microsoft.com/office/drawing/2014/main" id="{E8875089-E0CA-BAAB-8119-D759BDD7DFD5}"/>
+                  </a:ext>
+                </a:extLst>
+              </p:cNvPr>
+              <p:cNvSpPr>
+                <a:spLocks noGrp="1"/>
+              </p:cNvSpPr>
+              <p:nvPr>
+                <p:ph idx="1"/>
+              </p:nvPr>
+            </p:nvSpPr>
+            <p:spPr>
+              <a:xfrm>
+                <a:off x="838200" y="1614009"/>
+                <a:ext cx="10054820" cy="4562954"/>
+              </a:xfrm>
+            </p:spPr>
+            <p:txBody>
+              <a:bodyPr>
+                <a:normAutofit/>
+              </a:bodyPr>
+              <a:lstStyle/>
+              <a:p>
+                <a:r>
+                  <a:rPr lang="en-GB" dirty="0"/>
+                  <a:t>So we can approximate the posterior with ABC and NPEs but these estimates are not normalised</a:t>
+                </a:r>
+              </a:p>
+              <a:p>
+                <a:endParaRPr lang="en-GB" dirty="0"/>
+              </a:p>
+              <a:p>
+                <a:r>
+                  <a:rPr lang="en-GB" dirty="0"/>
+                  <a:t>NREs help us solve this issue by predicting ratios of densities</a:t>
+                </a:r>
+              </a:p>
+              <a:p>
+                <a:endParaRPr lang="en-GB" dirty="0"/>
+              </a:p>
+              <a:p>
+                <a:r>
+                  <a:rPr lang="en-GB" dirty="0"/>
+                  <a:t>Typically we set NREs up to give us the ratio </a:t>
+                </a:r>
+                <a14:m>
+                  <m:oMath xmlns:m="http://schemas.openxmlformats.org/officeDocument/2006/math">
+                    <m:f>
+                      <m:fPr>
+                        <m:ctrlPr>
+                          <a:rPr lang="en-GB" b="0" i="1" smtClean="0">
+                            <a:latin typeface="Cambria Math" panose="02040503050406030204" pitchFamily="18" charset="0"/>
+                          </a:rPr>
+                        </m:ctrlPr>
+                      </m:fPr>
+                      <m:num>
+                        <m:r>
+                          <a:rPr lang="en-GB" b="0" i="1" smtClean="0">
+                            <a:latin typeface="Cambria Math" panose="02040503050406030204" pitchFamily="18" charset="0"/>
+                          </a:rPr>
+                          <m:t>𝑃</m:t>
+                        </m:r>
+                        <m:r>
+                          <a:rPr lang="en-GB" b="0" i="1" smtClean="0">
+                            <a:latin typeface="Cambria Math" panose="02040503050406030204" pitchFamily="18" charset="0"/>
+                          </a:rPr>
+                          <m:t>(</m:t>
+                        </m:r>
+                        <m:r>
+                          <a:rPr lang="en-GB" b="0" i="1" smtClean="0">
+                            <a:latin typeface="Cambria Math" panose="02040503050406030204" pitchFamily="18" charset="0"/>
+                          </a:rPr>
+                          <m:t>𝐷</m:t>
+                        </m:r>
+                        <m:r>
+                          <a:rPr lang="en-GB" b="0" i="1" smtClean="0">
+                            <a:latin typeface="Cambria Math" panose="02040503050406030204" pitchFamily="18" charset="0"/>
+                          </a:rPr>
+                          <m:t>|</m:t>
+                        </m:r>
+                        <m:r>
+                          <a:rPr lang="en-GB" b="0" i="1" smtClean="0">
+                            <a:latin typeface="Cambria Math" panose="02040503050406030204" pitchFamily="18" charset="0"/>
+                          </a:rPr>
+                          <m:t>𝜃</m:t>
+                        </m:r>
+                        <m:r>
+                          <a:rPr lang="en-GB" b="0" i="1" smtClean="0">
+                            <a:latin typeface="Cambria Math" panose="02040503050406030204" pitchFamily="18" charset="0"/>
+                          </a:rPr>
+                          <m:t>)</m:t>
+                        </m:r>
+                      </m:num>
+                      <m:den>
+                        <m:r>
+                          <a:rPr lang="en-GB" b="0" i="1" smtClean="0">
+                            <a:latin typeface="Cambria Math" panose="02040503050406030204" pitchFamily="18" charset="0"/>
+                          </a:rPr>
+                          <m:t>𝑃</m:t>
+                        </m:r>
+                        <m:r>
+                          <a:rPr lang="en-GB" b="0" i="1" smtClean="0">
+                            <a:latin typeface="Cambria Math" panose="02040503050406030204" pitchFamily="18" charset="0"/>
+                          </a:rPr>
+                          <m:t>(</m:t>
+                        </m:r>
+                        <m:r>
+                          <a:rPr lang="en-GB" b="0" i="1" smtClean="0">
+                            <a:latin typeface="Cambria Math" panose="02040503050406030204" pitchFamily="18" charset="0"/>
+                          </a:rPr>
+                          <m:t>𝐷</m:t>
+                        </m:r>
+                        <m:r>
+                          <a:rPr lang="en-GB" b="0" i="1" smtClean="0">
+                            <a:latin typeface="Cambria Math" panose="02040503050406030204" pitchFamily="18" charset="0"/>
+                          </a:rPr>
+                          <m:t>)</m:t>
+                        </m:r>
+                      </m:den>
+                    </m:f>
+                    <m:r>
+                      <a:rPr lang="en-GB" b="0" i="1" smtClean="0">
+                        <a:latin typeface="Cambria Math" panose="02040503050406030204" pitchFamily="18" charset="0"/>
+                      </a:rPr>
+                      <m:t>= </m:t>
+                    </m:r>
+                    <m:f>
+                      <m:fPr>
+                        <m:ctrlPr>
+                          <a:rPr lang="en-GB" b="0" i="1" smtClean="0">
+                            <a:latin typeface="Cambria Math" panose="02040503050406030204" pitchFamily="18" charset="0"/>
+                          </a:rPr>
+                        </m:ctrlPr>
+                      </m:fPr>
+                      <m:num>
+                        <m:r>
+                          <a:rPr lang="en-GB" b="0" i="1" smtClean="0">
+                            <a:latin typeface="Cambria Math" panose="02040503050406030204" pitchFamily="18" charset="0"/>
+                          </a:rPr>
+                          <m:t>𝐿</m:t>
+                        </m:r>
+                        <m:r>
+                          <a:rPr lang="en-GB" b="0" i="1" smtClean="0">
+                            <a:latin typeface="Cambria Math" panose="02040503050406030204" pitchFamily="18" charset="0"/>
+                          </a:rPr>
+                          <m:t>(</m:t>
+                        </m:r>
+                        <m:r>
+                          <a:rPr lang="en-GB" b="0" i="1" smtClean="0">
+                            <a:latin typeface="Cambria Math" panose="02040503050406030204" pitchFamily="18" charset="0"/>
+                          </a:rPr>
+                          <m:t>𝜃</m:t>
+                        </m:r>
+                        <m:r>
+                          <a:rPr lang="en-GB" b="0" i="1" smtClean="0">
+                            <a:latin typeface="Cambria Math" panose="02040503050406030204" pitchFamily="18" charset="0"/>
+                          </a:rPr>
+                          <m:t>)</m:t>
+                        </m:r>
+                      </m:num>
+                      <m:den>
+                        <m:r>
+                          <a:rPr lang="en-GB" b="0" i="1" smtClean="0">
+                            <a:latin typeface="Cambria Math" panose="02040503050406030204" pitchFamily="18" charset="0"/>
+                          </a:rPr>
+                          <m:t>𝑍</m:t>
+                        </m:r>
+                      </m:den>
+                    </m:f>
+                  </m:oMath>
+                </a14:m>
+                <a:endParaRPr lang="en-GB" b="0" dirty="0"/>
+              </a:p>
+              <a:p>
+                <a:endParaRPr lang="en-GB" b="0" dirty="0"/>
+              </a:p>
+              <a:p>
+                <a:r>
+                  <a:rPr lang="en-GB" dirty="0"/>
+                  <a:t>We can sample over our NRE and multiply the ratio with a prior probability to recover a properly normalised posterior</a:t>
+                </a:r>
+              </a:p>
+            </p:txBody>
+          </p:sp>
+        </mc:Choice>
+        <mc:Fallback>
+          <p:sp>
+            <p:nvSpPr>
+              <p:cNvPr id="3" name="Content Placeholder 2">
+                <a:extLst>
+                  <a:ext uri="{FF2B5EF4-FFF2-40B4-BE49-F238E27FC236}">
+                    <a16:creationId xmlns:a16="http://schemas.microsoft.com/office/drawing/2014/main" id="{E8875089-E0CA-BAAB-8119-D759BDD7DFD5}"/>
+                  </a:ext>
+                </a:extLst>
+              </p:cNvPr>
+              <p:cNvSpPr>
+                <a:spLocks noGrp="1" noRot="1" noChangeAspect="1" noMove="1" noResize="1" noEditPoints="1" noAdjustHandles="1" noChangeArrowheads="1" noChangeShapeType="1" noTextEdit="1"/>
+              </p:cNvSpPr>
+              <p:nvPr>
+                <p:ph idx="1"/>
+              </p:nvPr>
+            </p:nvSpPr>
+            <p:spPr>
+              <a:xfrm>
+                <a:off x="838200" y="1614009"/>
+                <a:ext cx="10054820" cy="4562954"/>
+              </a:xfrm>
+              <a:blipFill>
+                <a:blip r:embed="rId2"/>
+                <a:stretch>
+                  <a:fillRect l="-1136" t="-2222" r="-1515" b="-3056"/>
+                </a:stretch>
+              </a:blipFill>
+            </p:spPr>
+            <p:txBody>
+              <a:bodyPr/>
+              <a:lstStyle/>
+              <a:p>
+                <a:r>
+                  <a:rPr lang="en-US">
+                    <a:noFill/>
+                  </a:rPr>
+                  <a:t> </a:t>
+                </a:r>
+              </a:p>
+            </p:txBody>
+          </p:sp>
+        </mc:Fallback>
+      </mc:AlternateContent>
+    </p:spTree>
+    <p:extLst>
+      <p:ext uri="{BB962C8B-B14F-4D97-AF65-F5344CB8AC3E}">
+        <p14:creationId xmlns:p14="http://schemas.microsoft.com/office/powerpoint/2010/main" val="900687793"/>
+      </p:ext>
+    </p:extLst>
+  </p:cSld>
+  <p:clrMapOvr>
+    <a:masterClrMapping/>
+  </p:clrMapOvr>
+</p:sld>
+</file>
+
+<file path=ppt/slides/slide25.xml><?xml version="1.0" encoding="utf-8"?>
+<p:sld xmlns:a="http://schemas.openxmlformats.org/drawingml/2006/main" xmlns:r="http://schemas.openxmlformats.org/officeDocument/2006/relationships" xmlns:p="http://schemas.openxmlformats.org/presentationml/2006/main">
+  <p:cSld>
+    <p:spTree>
+      <p:nvGrpSpPr>
+        <p:cNvPr id="1" name=""/>
+        <p:cNvGrpSpPr/>
+        <p:nvPr/>
+      </p:nvGrpSpPr>
+      <p:grpSpPr>
+        <a:xfrm>
+          <a:off x="0" y="0"/>
+          <a:ext cx="0" cy="0"/>
+          <a:chOff x="0" y="0"/>
+          <a:chExt cx="0" cy="0"/>
+        </a:xfrm>
+      </p:grpSpPr>
+      <p:sp>
+        <p:nvSpPr>
+          <p:cNvPr id="2" name="Title 1">
+            <a:extLst>
+              <a:ext uri="{FF2B5EF4-FFF2-40B4-BE49-F238E27FC236}">
+                <a16:creationId xmlns:a16="http://schemas.microsoft.com/office/drawing/2014/main" id="{BA657AB3-EDFB-007E-B0AC-C4711988CC5E}"/>
+              </a:ext>
+            </a:extLst>
+          </p:cNvPr>
+          <p:cNvSpPr>
+            <a:spLocks noGrp="1"/>
+          </p:cNvSpPr>
+          <p:nvPr>
+            <p:ph type="title"/>
+          </p:nvPr>
+        </p:nvSpPr>
+        <p:spPr/>
+        <p:txBody>
+          <a:bodyPr/>
+          <a:lstStyle/>
+          <a:p>
+            <a:r>
+              <a:rPr lang="en-US" dirty="0">
+                <a:solidFill>
+                  <a:srgbClr val="C00000"/>
+                </a:solidFill>
+              </a:rPr>
+              <a:t>As a classification problem</a:t>
+            </a:r>
+          </a:p>
+        </p:txBody>
+      </p:sp>
+      <p:sp>
+        <p:nvSpPr>
+          <p:cNvPr id="4" name="Footer Placeholder 3">
+            <a:extLst>
+              <a:ext uri="{FF2B5EF4-FFF2-40B4-BE49-F238E27FC236}">
+                <a16:creationId xmlns:a16="http://schemas.microsoft.com/office/drawing/2014/main" id="{5B37B85D-4118-2515-D53D-475C4E66C472}"/>
+              </a:ext>
+            </a:extLst>
+          </p:cNvPr>
+          <p:cNvSpPr>
+            <a:spLocks noGrp="1"/>
+          </p:cNvSpPr>
+          <p:nvPr>
+            <p:ph type="ftr" sz="quarter" idx="11"/>
+          </p:nvPr>
+        </p:nvSpPr>
+        <p:spPr/>
+        <p:txBody>
+          <a:bodyPr/>
+          <a:lstStyle/>
+          <a:p>
+            <a:r>
+              <a:rPr lang="en-US"/>
+              <a:t>MPhil in DIS - Data Driven Radio Astronomy in the SKA era</a:t>
+            </a:r>
+          </a:p>
+        </p:txBody>
+      </p:sp>
+      <p:sp>
+        <p:nvSpPr>
+          <p:cNvPr id="5" name="Slide Number Placeholder 4">
+            <a:extLst>
+              <a:ext uri="{FF2B5EF4-FFF2-40B4-BE49-F238E27FC236}">
+                <a16:creationId xmlns:a16="http://schemas.microsoft.com/office/drawing/2014/main" id="{DF1CED66-178C-490A-3189-D188E2783F5F}"/>
+              </a:ext>
+            </a:extLst>
+          </p:cNvPr>
+          <p:cNvSpPr>
+            <a:spLocks noGrp="1"/>
+          </p:cNvSpPr>
+          <p:nvPr>
+            <p:ph type="sldNum" sz="quarter" idx="12"/>
+          </p:nvPr>
+        </p:nvSpPr>
+        <p:spPr/>
+        <p:txBody>
+          <a:bodyPr/>
+          <a:lstStyle/>
+          <a:p>
+            <a:fld id="{9AA976C4-0B8A-7C44-883E-604AFF758C0B}" type="slidenum">
+              <a:rPr lang="en-US" smtClean="0"/>
+              <a:t>25</a:t>
+            </a:fld>
+            <a:endParaRPr lang="en-US"/>
+          </a:p>
+        </p:txBody>
+      </p:sp>
+      <p:sp>
+        <p:nvSpPr>
+          <p:cNvPr id="6" name="Date Placeholder 5">
+            <a:extLst>
+              <a:ext uri="{FF2B5EF4-FFF2-40B4-BE49-F238E27FC236}">
+                <a16:creationId xmlns:a16="http://schemas.microsoft.com/office/drawing/2014/main" id="{4E6B5B9F-EDA9-548A-4004-336F2CE389B6}"/>
+              </a:ext>
+            </a:extLst>
+          </p:cNvPr>
+          <p:cNvSpPr>
+            <a:spLocks noGrp="1"/>
+          </p:cNvSpPr>
+          <p:nvPr>
+            <p:ph type="dt" sz="half" idx="10"/>
+          </p:nvPr>
+        </p:nvSpPr>
+        <p:spPr/>
+        <p:txBody>
+          <a:bodyPr/>
+          <a:lstStyle/>
+          <a:p>
+            <a:r>
+              <a:rPr lang="en-GB"/>
+              <a:t>2024</a:t>
+            </a:r>
+            <a:endParaRPr lang="en-US"/>
+          </a:p>
+        </p:txBody>
+      </p:sp>
+      <p:sp>
+        <p:nvSpPr>
+          <p:cNvPr id="3" name="Content Placeholder 2">
+            <a:extLst>
+              <a:ext uri="{FF2B5EF4-FFF2-40B4-BE49-F238E27FC236}">
+                <a16:creationId xmlns:a16="http://schemas.microsoft.com/office/drawing/2014/main" id="{E8875089-E0CA-BAAB-8119-D759BDD7DFD5}"/>
+              </a:ext>
+            </a:extLst>
+          </p:cNvPr>
+          <p:cNvSpPr>
+            <a:spLocks noGrp="1"/>
+          </p:cNvSpPr>
+          <p:nvPr>
+            <p:ph idx="1"/>
+          </p:nvPr>
+        </p:nvSpPr>
+        <p:spPr>
+          <a:xfrm>
+            <a:off x="838200" y="1614009"/>
+            <a:ext cx="10054820" cy="4562954"/>
+          </a:xfrm>
+        </p:spPr>
+        <p:txBody>
+          <a:bodyPr>
+            <a:normAutofit/>
+          </a:bodyPr>
+          <a:lstStyle/>
+          <a:p>
+            <a:r>
+              <a:rPr lang="en-GB" dirty="0"/>
+              <a:t>NREs are essentially classifiers</a:t>
+            </a:r>
+          </a:p>
+          <a:p>
+            <a:endParaRPr lang="en-GB" dirty="0"/>
+          </a:p>
+          <a:p>
+            <a:r>
+              <a:rPr lang="en-GB" dirty="0"/>
+              <a:t>During training we feed the neural network pairs of data and parameters that go together with a label (probability) of 1 and pairs that do not go together with label 0</a:t>
+            </a:r>
+          </a:p>
+          <a:p>
+            <a:endParaRPr lang="en-GB" dirty="0"/>
+          </a:p>
+          <a:p>
+            <a:r>
+              <a:rPr lang="en-GB" dirty="0"/>
+              <a:t>Use a binary cross entropy loss function</a:t>
+            </a:r>
+          </a:p>
+          <a:p>
+            <a:endParaRPr lang="en-GB" dirty="0"/>
+          </a:p>
+        </p:txBody>
+      </p:sp>
+    </p:spTree>
+    <p:extLst>
+      <p:ext uri="{BB962C8B-B14F-4D97-AF65-F5344CB8AC3E}">
+        <p14:creationId xmlns:p14="http://schemas.microsoft.com/office/powerpoint/2010/main" val="1024057831"/>
+      </p:ext>
+    </p:extLst>
+  </p:cSld>
+  <p:clrMapOvr>
+    <a:masterClrMapping/>
+  </p:clrMapOvr>
+</p:sld>
+</file>
+
+<file path=ppt/slides/slide26.xml><?xml version="1.0" encoding="utf-8"?>
+<p:sld xmlns:a="http://schemas.openxmlformats.org/drawingml/2006/main" xmlns:r="http://schemas.openxmlformats.org/officeDocument/2006/relationships" xmlns:p="http://schemas.openxmlformats.org/presentationml/2006/main">
+  <p:cSld>
+    <p:spTree>
+      <p:nvGrpSpPr>
+        <p:cNvPr id="1" name=""/>
+        <p:cNvGrpSpPr/>
+        <p:nvPr/>
+      </p:nvGrpSpPr>
+      <p:grpSpPr>
+        <a:xfrm>
+          <a:off x="0" y="0"/>
+          <a:ext cx="0" cy="0"/>
+          <a:chOff x="0" y="0"/>
+          <a:chExt cx="0" cy="0"/>
+        </a:xfrm>
+      </p:grpSpPr>
+      <p:sp>
+        <p:nvSpPr>
+          <p:cNvPr id="2" name="Title 1">
+            <a:extLst>
+              <a:ext uri="{FF2B5EF4-FFF2-40B4-BE49-F238E27FC236}">
+                <a16:creationId xmlns:a16="http://schemas.microsoft.com/office/drawing/2014/main" id="{BA657AB3-EDFB-007E-B0AC-C4711988CC5E}"/>
+              </a:ext>
+            </a:extLst>
+          </p:cNvPr>
+          <p:cNvSpPr>
+            <a:spLocks noGrp="1"/>
+          </p:cNvSpPr>
+          <p:nvPr>
+            <p:ph type="title"/>
+          </p:nvPr>
+        </p:nvSpPr>
+        <p:spPr/>
+        <p:txBody>
+          <a:bodyPr/>
+          <a:lstStyle/>
+          <a:p>
+            <a:r>
+              <a:rPr lang="en-US" dirty="0">
+                <a:solidFill>
+                  <a:srgbClr val="C00000"/>
+                </a:solidFill>
+              </a:rPr>
+              <a:t>As a classification problem</a:t>
+            </a:r>
+          </a:p>
+        </p:txBody>
+      </p:sp>
+      <p:sp>
+        <p:nvSpPr>
+          <p:cNvPr id="4" name="Footer Placeholder 3">
+            <a:extLst>
+              <a:ext uri="{FF2B5EF4-FFF2-40B4-BE49-F238E27FC236}">
+                <a16:creationId xmlns:a16="http://schemas.microsoft.com/office/drawing/2014/main" id="{5B37B85D-4118-2515-D53D-475C4E66C472}"/>
+              </a:ext>
+            </a:extLst>
+          </p:cNvPr>
+          <p:cNvSpPr>
+            <a:spLocks noGrp="1"/>
+          </p:cNvSpPr>
+          <p:nvPr>
+            <p:ph type="ftr" sz="quarter" idx="11"/>
+          </p:nvPr>
+        </p:nvSpPr>
+        <p:spPr/>
+        <p:txBody>
+          <a:bodyPr/>
+          <a:lstStyle/>
+          <a:p>
+            <a:r>
+              <a:rPr lang="en-US"/>
+              <a:t>MPhil in DIS - Data Driven Radio Astronomy in the SKA era</a:t>
+            </a:r>
+          </a:p>
+        </p:txBody>
+      </p:sp>
+      <p:sp>
+        <p:nvSpPr>
+          <p:cNvPr id="5" name="Slide Number Placeholder 4">
+            <a:extLst>
+              <a:ext uri="{FF2B5EF4-FFF2-40B4-BE49-F238E27FC236}">
+                <a16:creationId xmlns:a16="http://schemas.microsoft.com/office/drawing/2014/main" id="{DF1CED66-178C-490A-3189-D188E2783F5F}"/>
+              </a:ext>
+            </a:extLst>
+          </p:cNvPr>
+          <p:cNvSpPr>
+            <a:spLocks noGrp="1"/>
+          </p:cNvSpPr>
+          <p:nvPr>
+            <p:ph type="sldNum" sz="quarter" idx="12"/>
+          </p:nvPr>
+        </p:nvSpPr>
+        <p:spPr/>
+        <p:txBody>
+          <a:bodyPr/>
+          <a:lstStyle/>
+          <a:p>
+            <a:fld id="{9AA976C4-0B8A-7C44-883E-604AFF758C0B}" type="slidenum">
+              <a:rPr lang="en-US" smtClean="0"/>
+              <a:t>26</a:t>
+            </a:fld>
+            <a:endParaRPr lang="en-US"/>
+          </a:p>
+        </p:txBody>
+      </p:sp>
+      <p:sp>
+        <p:nvSpPr>
+          <p:cNvPr id="6" name="Date Placeholder 5">
+            <a:extLst>
+              <a:ext uri="{FF2B5EF4-FFF2-40B4-BE49-F238E27FC236}">
+                <a16:creationId xmlns:a16="http://schemas.microsoft.com/office/drawing/2014/main" id="{4E6B5B9F-EDA9-548A-4004-336F2CE389B6}"/>
+              </a:ext>
+            </a:extLst>
+          </p:cNvPr>
+          <p:cNvSpPr>
+            <a:spLocks noGrp="1"/>
+          </p:cNvSpPr>
+          <p:nvPr>
+            <p:ph type="dt" sz="half" idx="10"/>
+          </p:nvPr>
+        </p:nvSpPr>
+        <p:spPr/>
+        <p:txBody>
+          <a:bodyPr/>
+          <a:lstStyle/>
+          <a:p>
+            <a:r>
+              <a:rPr lang="en-GB"/>
+              <a:t>2024</a:t>
+            </a:r>
+            <a:endParaRPr lang="en-US"/>
+          </a:p>
+        </p:txBody>
+      </p:sp>
+      <mc:AlternateContent xmlns:mc="http://schemas.openxmlformats.org/markup-compatibility/2006">
+        <mc:Choice xmlns:a14="http://schemas.microsoft.com/office/drawing/2010/main" Requires="a14">
+          <p:sp>
+            <p:nvSpPr>
+              <p:cNvPr id="3" name="Content Placeholder 2">
+                <a:extLst>
+                  <a:ext uri="{FF2B5EF4-FFF2-40B4-BE49-F238E27FC236}">
+                    <a16:creationId xmlns:a16="http://schemas.microsoft.com/office/drawing/2014/main" id="{E8875089-E0CA-BAAB-8119-D759BDD7DFD5}"/>
+                  </a:ext>
+                </a:extLst>
+              </p:cNvPr>
+              <p:cNvSpPr>
+                <a:spLocks noGrp="1"/>
+              </p:cNvSpPr>
+              <p:nvPr>
+                <p:ph idx="1"/>
+              </p:nvPr>
+            </p:nvSpPr>
+            <p:spPr>
+              <a:xfrm>
+                <a:off x="838200" y="1614009"/>
+                <a:ext cx="10054820" cy="4562954"/>
+              </a:xfrm>
+            </p:spPr>
+            <p:txBody>
+              <a:bodyPr>
+                <a:normAutofit fontScale="77500" lnSpcReduction="20000"/>
+              </a:bodyPr>
+              <a:lstStyle/>
+              <a:p>
+                <a:r>
+                  <a:rPr lang="en-GB" dirty="0"/>
+                  <a:t>The network learns to predict the following ratio for pairs of simulations </a:t>
+                </a:r>
+                <a14:m>
+                  <m:oMath xmlns:m="http://schemas.openxmlformats.org/officeDocument/2006/math">
+                    <m:acc>
+                      <m:accPr>
+                        <m:chr m:val="̃"/>
+                        <m:ctrlPr>
+                          <a:rPr lang="en-GB" b="0" i="1" smtClean="0">
+                            <a:latin typeface="Cambria Math" panose="02040503050406030204" pitchFamily="18" charset="0"/>
+                          </a:rPr>
+                        </m:ctrlPr>
+                      </m:accPr>
+                      <m:e>
+                        <m:r>
+                          <a:rPr lang="en-GB" b="0" i="1" smtClean="0">
+                            <a:latin typeface="Cambria Math" panose="02040503050406030204" pitchFamily="18" charset="0"/>
+                          </a:rPr>
+                          <m:t>𝐷</m:t>
+                        </m:r>
+                      </m:e>
+                    </m:acc>
+                  </m:oMath>
+                </a14:m>
+                <a:r>
+                  <a:rPr lang="en-GB" dirty="0"/>
+                  <a:t> and parameters </a:t>
+                </a:r>
+                <a14:m>
+                  <m:oMath xmlns:m="http://schemas.openxmlformats.org/officeDocument/2006/math">
+                    <m:r>
+                      <a:rPr lang="en-GB" b="0" i="1" smtClean="0">
+                        <a:latin typeface="Cambria Math" panose="02040503050406030204" pitchFamily="18" charset="0"/>
+                      </a:rPr>
+                      <m:t>𝜃</m:t>
+                    </m:r>
+                  </m:oMath>
+                </a14:m>
+                <a:endParaRPr lang="en-GB" dirty="0"/>
+              </a:p>
+              <a:p>
+                <a:endParaRPr lang="en-GB" b="0" i="1" dirty="0">
+                  <a:latin typeface="Cambria Math" panose="02040503050406030204" pitchFamily="18" charset="0"/>
+                </a:endParaRPr>
+              </a:p>
+              <a:p>
+                <a:pPr marL="0" indent="0">
+                  <a:buNone/>
+                </a:pPr>
+                <a14:m>
+                  <m:oMathPara xmlns:m="http://schemas.openxmlformats.org/officeDocument/2006/math">
+                    <m:oMathParaPr>
+                      <m:jc m:val="centerGroup"/>
+                    </m:oMathParaPr>
+                    <m:oMath xmlns:m="http://schemas.openxmlformats.org/officeDocument/2006/math">
+                      <m:r>
+                        <a:rPr lang="en-GB" b="0" i="1" smtClean="0">
+                          <a:latin typeface="Cambria Math" panose="02040503050406030204" pitchFamily="18" charset="0"/>
+                        </a:rPr>
+                        <m:t>𝑟</m:t>
+                      </m:r>
+                      <m:r>
+                        <a:rPr lang="en-GB" b="0" i="1" smtClean="0">
+                          <a:latin typeface="Cambria Math" panose="02040503050406030204" pitchFamily="18" charset="0"/>
+                        </a:rPr>
+                        <m:t>= </m:t>
+                      </m:r>
+                      <m:f>
+                        <m:fPr>
+                          <m:ctrlPr>
+                            <a:rPr lang="en-GB" b="0" i="1" smtClean="0">
+                              <a:latin typeface="Cambria Math" panose="02040503050406030204" pitchFamily="18" charset="0"/>
+                            </a:rPr>
+                          </m:ctrlPr>
+                        </m:fPr>
+                        <m:num>
+                          <m:r>
+                            <a:rPr lang="en-GB" b="0" i="1" smtClean="0">
+                              <a:latin typeface="Cambria Math" panose="02040503050406030204" pitchFamily="18" charset="0"/>
+                            </a:rPr>
+                            <m:t>𝑃</m:t>
+                          </m:r>
+                          <m:r>
+                            <a:rPr lang="en-GB" b="0" i="1" smtClean="0">
+                              <a:latin typeface="Cambria Math" panose="02040503050406030204" pitchFamily="18" charset="0"/>
+                            </a:rPr>
+                            <m:t>(</m:t>
+                          </m:r>
+                          <m:acc>
+                            <m:accPr>
+                              <m:chr m:val="̃"/>
+                              <m:ctrlPr>
+                                <a:rPr lang="en-GB" b="0" i="1" smtClean="0">
+                                  <a:latin typeface="Cambria Math" panose="02040503050406030204" pitchFamily="18" charset="0"/>
+                                </a:rPr>
+                              </m:ctrlPr>
+                            </m:accPr>
+                            <m:e>
+                              <m:r>
+                                <a:rPr lang="en-GB" b="0" i="1" smtClean="0">
+                                  <a:latin typeface="Cambria Math" panose="02040503050406030204" pitchFamily="18" charset="0"/>
+                                </a:rPr>
+                                <m:t>𝐷</m:t>
+                              </m:r>
+                            </m:e>
+                          </m:acc>
+                          <m:r>
+                            <a:rPr lang="en-GB" b="0" i="1" smtClean="0">
+                              <a:latin typeface="Cambria Math" panose="02040503050406030204" pitchFamily="18" charset="0"/>
+                            </a:rPr>
+                            <m:t>, </m:t>
+                          </m:r>
+                          <m:r>
+                            <a:rPr lang="en-GB" b="0" i="1" smtClean="0">
+                              <a:latin typeface="Cambria Math" panose="02040503050406030204" pitchFamily="18" charset="0"/>
+                            </a:rPr>
+                            <m:t>𝜃</m:t>
+                          </m:r>
+                          <m:r>
+                            <a:rPr lang="en-GB" b="0" i="1" smtClean="0">
+                              <a:latin typeface="Cambria Math" panose="02040503050406030204" pitchFamily="18" charset="0"/>
+                            </a:rPr>
+                            <m:t>)</m:t>
+                          </m:r>
+                        </m:num>
+                        <m:den>
+                          <m:r>
+                            <a:rPr lang="en-GB" b="0" i="1" smtClean="0">
+                              <a:latin typeface="Cambria Math" panose="02040503050406030204" pitchFamily="18" charset="0"/>
+                            </a:rPr>
+                            <m:t>𝑃</m:t>
+                          </m:r>
+                          <m:d>
+                            <m:dPr>
+                              <m:ctrlPr>
+                                <a:rPr lang="en-GB" b="0" i="1" smtClean="0">
+                                  <a:latin typeface="Cambria Math" panose="02040503050406030204" pitchFamily="18" charset="0"/>
+                                </a:rPr>
+                              </m:ctrlPr>
+                            </m:dPr>
+                            <m:e>
+                              <m:acc>
+                                <m:accPr>
+                                  <m:chr m:val="̃"/>
+                                  <m:ctrlPr>
+                                    <a:rPr lang="en-GB" i="1">
+                                      <a:latin typeface="Cambria Math" panose="02040503050406030204" pitchFamily="18" charset="0"/>
+                                    </a:rPr>
+                                  </m:ctrlPr>
+                                </m:accPr>
+                                <m:e>
+                                  <m:r>
+                                    <a:rPr lang="en-GB" i="1">
+                                      <a:latin typeface="Cambria Math" panose="02040503050406030204" pitchFamily="18" charset="0"/>
+                                    </a:rPr>
+                                    <m:t>𝐷</m:t>
+                                  </m:r>
+                                </m:e>
+                              </m:acc>
+                            </m:e>
+                          </m:d>
+                          <m:r>
+                            <a:rPr lang="en-GB" b="0" i="1" smtClean="0">
+                              <a:latin typeface="Cambria Math" panose="02040503050406030204" pitchFamily="18" charset="0"/>
+                            </a:rPr>
+                            <m:t>𝑃</m:t>
+                          </m:r>
+                          <m:r>
+                            <a:rPr lang="en-GB" b="0" i="1" smtClean="0">
+                              <a:latin typeface="Cambria Math" panose="02040503050406030204" pitchFamily="18" charset="0"/>
+                            </a:rPr>
+                            <m:t>(</m:t>
+                          </m:r>
+                          <m:r>
+                            <a:rPr lang="en-GB" b="0" i="1" smtClean="0">
+                              <a:latin typeface="Cambria Math" panose="02040503050406030204" pitchFamily="18" charset="0"/>
+                            </a:rPr>
+                            <m:t>𝜃</m:t>
+                          </m:r>
+                          <m:r>
+                            <a:rPr lang="en-GB" b="0" i="1" smtClean="0">
+                              <a:latin typeface="Cambria Math" panose="02040503050406030204" pitchFamily="18" charset="0"/>
+                            </a:rPr>
+                            <m:t>)</m:t>
+                          </m:r>
+                        </m:den>
+                      </m:f>
+                    </m:oMath>
+                  </m:oMathPara>
+                </a14:m>
+                <a:endParaRPr lang="en-GB" b="0" dirty="0"/>
+              </a:p>
+              <a:p>
+                <a:endParaRPr lang="en-GB" dirty="0"/>
+              </a:p>
+              <a:p>
+                <a:r>
+                  <a:rPr lang="en-GB" dirty="0"/>
+                  <a:t>Which is the ratio of the probability that the simulation and parameters are from the joint distribution or are independent samples</a:t>
+                </a:r>
+              </a:p>
+              <a:p>
+                <a:endParaRPr lang="en-GB" dirty="0"/>
+              </a:p>
+              <a:p>
+                <a:r>
+                  <a:rPr lang="en-GB" dirty="0"/>
+                  <a:t>We can express this in more familiar language as</a:t>
+                </a:r>
+              </a:p>
+              <a:p>
+                <a:endParaRPr lang="en-GB" dirty="0"/>
+              </a:p>
+              <a:p>
+                <a:pPr marL="0" indent="0">
+                  <a:buNone/>
+                </a:pPr>
+                <a14:m>
+                  <m:oMathPara xmlns:m="http://schemas.openxmlformats.org/officeDocument/2006/math">
+                    <m:oMathParaPr>
+                      <m:jc m:val="center"/>
+                    </m:oMathParaPr>
+                    <m:oMath xmlns:m="http://schemas.openxmlformats.org/officeDocument/2006/math">
+                      <m:r>
+                        <a:rPr lang="en-GB" b="0" i="1" smtClean="0">
+                          <a:latin typeface="Cambria Math" panose="02040503050406030204" pitchFamily="18" charset="0"/>
+                        </a:rPr>
+                        <m:t>𝑟</m:t>
+                      </m:r>
+                      <m:r>
+                        <a:rPr lang="en-GB" b="0" i="1" smtClean="0">
+                          <a:latin typeface="Cambria Math" panose="02040503050406030204" pitchFamily="18" charset="0"/>
+                        </a:rPr>
+                        <m:t>=</m:t>
+                      </m:r>
+                      <m:f>
+                        <m:fPr>
+                          <m:ctrlPr>
+                            <a:rPr lang="en-GB" i="1">
+                              <a:latin typeface="Cambria Math" panose="02040503050406030204" pitchFamily="18" charset="0"/>
+                            </a:rPr>
+                          </m:ctrlPr>
+                        </m:fPr>
+                        <m:num>
+                          <m:r>
+                            <a:rPr lang="en-GB" i="1">
+                              <a:latin typeface="Cambria Math" panose="02040503050406030204" pitchFamily="18" charset="0"/>
+                            </a:rPr>
+                            <m:t>𝑃</m:t>
+                          </m:r>
+                          <m:r>
+                            <a:rPr lang="en-GB" i="1">
+                              <a:latin typeface="Cambria Math" panose="02040503050406030204" pitchFamily="18" charset="0"/>
+                            </a:rPr>
+                            <m:t>(</m:t>
+                          </m:r>
+                          <m:acc>
+                            <m:accPr>
+                              <m:chr m:val="̃"/>
+                              <m:ctrlPr>
+                                <a:rPr lang="en-GB" i="1">
+                                  <a:latin typeface="Cambria Math" panose="02040503050406030204" pitchFamily="18" charset="0"/>
+                                </a:rPr>
+                              </m:ctrlPr>
+                            </m:accPr>
+                            <m:e>
+                              <m:r>
+                                <a:rPr lang="en-GB" i="1">
+                                  <a:latin typeface="Cambria Math" panose="02040503050406030204" pitchFamily="18" charset="0"/>
+                                </a:rPr>
+                                <m:t>𝐷</m:t>
+                              </m:r>
+                            </m:e>
+                          </m:acc>
+                          <m:r>
+                            <a:rPr lang="en-GB" i="1">
+                              <a:latin typeface="Cambria Math" panose="02040503050406030204" pitchFamily="18" charset="0"/>
+                            </a:rPr>
+                            <m:t>, </m:t>
+                          </m:r>
+                          <m:r>
+                            <a:rPr lang="en-GB" i="1">
+                              <a:latin typeface="Cambria Math" panose="02040503050406030204" pitchFamily="18" charset="0"/>
+                            </a:rPr>
+                            <m:t>𝜃</m:t>
+                          </m:r>
+                          <m:r>
+                            <a:rPr lang="en-GB" i="1">
+                              <a:latin typeface="Cambria Math" panose="02040503050406030204" pitchFamily="18" charset="0"/>
+                            </a:rPr>
+                            <m:t>)</m:t>
+                          </m:r>
+                        </m:num>
+                        <m:den>
+                          <m:r>
+                            <a:rPr lang="en-GB" i="1">
+                              <a:latin typeface="Cambria Math" panose="02040503050406030204" pitchFamily="18" charset="0"/>
+                            </a:rPr>
+                            <m:t>𝑃</m:t>
+                          </m:r>
+                          <m:d>
+                            <m:dPr>
+                              <m:ctrlPr>
+                                <a:rPr lang="en-GB" i="1">
+                                  <a:latin typeface="Cambria Math" panose="02040503050406030204" pitchFamily="18" charset="0"/>
+                                </a:rPr>
+                              </m:ctrlPr>
+                            </m:dPr>
+                            <m:e>
+                              <m:acc>
+                                <m:accPr>
+                                  <m:chr m:val="̃"/>
+                                  <m:ctrlPr>
+                                    <a:rPr lang="en-GB" i="1">
+                                      <a:latin typeface="Cambria Math" panose="02040503050406030204" pitchFamily="18" charset="0"/>
+                                    </a:rPr>
+                                  </m:ctrlPr>
+                                </m:accPr>
+                                <m:e>
+                                  <m:r>
+                                    <a:rPr lang="en-GB" i="1">
+                                      <a:latin typeface="Cambria Math" panose="02040503050406030204" pitchFamily="18" charset="0"/>
+                                    </a:rPr>
+                                    <m:t>𝐷</m:t>
+                                  </m:r>
+                                </m:e>
+                              </m:acc>
+                            </m:e>
+                          </m:d>
+                          <m:r>
+                            <a:rPr lang="en-GB" i="1">
+                              <a:latin typeface="Cambria Math" panose="02040503050406030204" pitchFamily="18" charset="0"/>
+                            </a:rPr>
+                            <m:t>𝑃</m:t>
+                          </m:r>
+                          <m:r>
+                            <a:rPr lang="en-GB" i="1">
+                              <a:latin typeface="Cambria Math" panose="02040503050406030204" pitchFamily="18" charset="0"/>
+                            </a:rPr>
+                            <m:t>(</m:t>
+                          </m:r>
+                          <m:r>
+                            <a:rPr lang="en-GB" i="1">
+                              <a:latin typeface="Cambria Math" panose="02040503050406030204" pitchFamily="18" charset="0"/>
+                            </a:rPr>
+                            <m:t>𝜃</m:t>
+                          </m:r>
+                          <m:r>
+                            <a:rPr lang="en-GB" i="1">
+                              <a:latin typeface="Cambria Math" panose="02040503050406030204" pitchFamily="18" charset="0"/>
+                            </a:rPr>
+                            <m:t>)</m:t>
+                          </m:r>
+                        </m:den>
+                      </m:f>
+                      <m:r>
+                        <a:rPr lang="en-GB" b="0" i="1" smtClean="0">
+                          <a:latin typeface="Cambria Math" panose="02040503050406030204" pitchFamily="18" charset="0"/>
+                        </a:rPr>
+                        <m:t>= </m:t>
+                      </m:r>
+                      <m:f>
+                        <m:fPr>
+                          <m:ctrlPr>
+                            <a:rPr lang="en-GB" b="0" i="1" smtClean="0">
+                              <a:latin typeface="Cambria Math" panose="02040503050406030204" pitchFamily="18" charset="0"/>
+                            </a:rPr>
+                          </m:ctrlPr>
+                        </m:fPr>
+                        <m:num>
+                          <m:r>
+                            <a:rPr lang="en-GB" b="0" i="1" smtClean="0">
+                              <a:latin typeface="Cambria Math" panose="02040503050406030204" pitchFamily="18" charset="0"/>
+                            </a:rPr>
+                            <m:t>𝑃</m:t>
+                          </m:r>
+                          <m:r>
+                            <a:rPr lang="en-GB" b="0" i="1" smtClean="0">
+                              <a:latin typeface="Cambria Math" panose="02040503050406030204" pitchFamily="18" charset="0"/>
+                            </a:rPr>
+                            <m:t>(</m:t>
+                          </m:r>
+                          <m:acc>
+                            <m:accPr>
+                              <m:chr m:val="̃"/>
+                              <m:ctrlPr>
+                                <a:rPr lang="en-GB" i="1">
+                                  <a:latin typeface="Cambria Math" panose="02040503050406030204" pitchFamily="18" charset="0"/>
+                                </a:rPr>
+                              </m:ctrlPr>
+                            </m:accPr>
+                            <m:e>
+                              <m:r>
+                                <a:rPr lang="en-GB" i="1">
+                                  <a:latin typeface="Cambria Math" panose="02040503050406030204" pitchFamily="18" charset="0"/>
+                                </a:rPr>
+                                <m:t>𝐷</m:t>
+                              </m:r>
+                            </m:e>
+                          </m:acc>
+                          <m:r>
+                            <a:rPr lang="en-GB" b="0" i="1" smtClean="0">
+                              <a:latin typeface="Cambria Math" panose="02040503050406030204" pitchFamily="18" charset="0"/>
+                            </a:rPr>
+                            <m:t>|</m:t>
+                          </m:r>
+                          <m:r>
+                            <a:rPr lang="en-GB" b="0" i="1" smtClean="0">
+                              <a:latin typeface="Cambria Math" panose="02040503050406030204" pitchFamily="18" charset="0"/>
+                            </a:rPr>
+                            <m:t>𝜃</m:t>
+                          </m:r>
+                          <m:r>
+                            <a:rPr lang="en-GB" b="0" i="1" smtClean="0">
+                              <a:latin typeface="Cambria Math" panose="02040503050406030204" pitchFamily="18" charset="0"/>
+                            </a:rPr>
+                            <m:t>)</m:t>
+                          </m:r>
+                          <m:r>
+                            <a:rPr lang="en-GB" b="0" i="1" smtClean="0">
+                              <a:latin typeface="Cambria Math" panose="02040503050406030204" pitchFamily="18" charset="0"/>
+                            </a:rPr>
+                            <m:t>𝑃</m:t>
+                          </m:r>
+                          <m:r>
+                            <a:rPr lang="en-GB" b="0" i="1" smtClean="0">
+                              <a:latin typeface="Cambria Math" panose="02040503050406030204" pitchFamily="18" charset="0"/>
+                            </a:rPr>
+                            <m:t>(</m:t>
+                          </m:r>
+                          <m:r>
+                            <a:rPr lang="en-GB" b="0" i="1" smtClean="0">
+                              <a:latin typeface="Cambria Math" panose="02040503050406030204" pitchFamily="18" charset="0"/>
+                            </a:rPr>
+                            <m:t>𝜃</m:t>
+                          </m:r>
+                          <m:r>
+                            <a:rPr lang="en-GB" b="0" i="1" smtClean="0">
+                              <a:latin typeface="Cambria Math" panose="02040503050406030204" pitchFamily="18" charset="0"/>
+                            </a:rPr>
+                            <m:t>)</m:t>
+                          </m:r>
+                        </m:num>
+                        <m:den>
+                          <m:r>
+                            <a:rPr lang="en-GB" b="0" i="1" smtClean="0">
+                              <a:latin typeface="Cambria Math" panose="02040503050406030204" pitchFamily="18" charset="0"/>
+                            </a:rPr>
+                            <m:t>𝑃</m:t>
+                          </m:r>
+                          <m:d>
+                            <m:dPr>
+                              <m:ctrlPr>
+                                <a:rPr lang="en-GB" b="0" i="1" smtClean="0">
+                                  <a:latin typeface="Cambria Math" panose="02040503050406030204" pitchFamily="18" charset="0"/>
+                                </a:rPr>
+                              </m:ctrlPr>
+                            </m:dPr>
+                            <m:e>
+                              <m:acc>
+                                <m:accPr>
+                                  <m:chr m:val="̃"/>
+                                  <m:ctrlPr>
+                                    <a:rPr lang="en-GB" i="1">
+                                      <a:latin typeface="Cambria Math" panose="02040503050406030204" pitchFamily="18" charset="0"/>
+                                    </a:rPr>
+                                  </m:ctrlPr>
+                                </m:accPr>
+                                <m:e>
+                                  <m:r>
+                                    <a:rPr lang="en-GB" i="1">
+                                      <a:latin typeface="Cambria Math" panose="02040503050406030204" pitchFamily="18" charset="0"/>
+                                    </a:rPr>
+                                    <m:t>𝐷</m:t>
+                                  </m:r>
+                                </m:e>
+                              </m:acc>
+                            </m:e>
+                          </m:d>
+                          <m:r>
+                            <a:rPr lang="en-GB" b="0" i="1" smtClean="0">
+                              <a:latin typeface="Cambria Math" panose="02040503050406030204" pitchFamily="18" charset="0"/>
+                            </a:rPr>
+                            <m:t>𝑃</m:t>
+                          </m:r>
+                          <m:r>
+                            <a:rPr lang="en-GB" b="0" i="1" smtClean="0">
+                              <a:latin typeface="Cambria Math" panose="02040503050406030204" pitchFamily="18" charset="0"/>
+                            </a:rPr>
+                            <m:t>(</m:t>
+                          </m:r>
+                          <m:r>
+                            <a:rPr lang="en-GB" b="0" i="1" smtClean="0">
+                              <a:latin typeface="Cambria Math" panose="02040503050406030204" pitchFamily="18" charset="0"/>
+                            </a:rPr>
+                            <m:t>𝜃</m:t>
+                          </m:r>
+                          <m:r>
+                            <a:rPr lang="en-GB" b="0" i="1" smtClean="0">
+                              <a:latin typeface="Cambria Math" panose="02040503050406030204" pitchFamily="18" charset="0"/>
+                            </a:rPr>
+                            <m:t>)</m:t>
+                          </m:r>
+                        </m:den>
+                      </m:f>
+                      <m:r>
+                        <a:rPr lang="en-GB" b="0" i="1" smtClean="0">
+                          <a:latin typeface="Cambria Math" panose="02040503050406030204" pitchFamily="18" charset="0"/>
+                        </a:rPr>
+                        <m:t>= </m:t>
+                      </m:r>
+                      <m:f>
+                        <m:fPr>
+                          <m:ctrlPr>
+                            <a:rPr lang="en-GB" b="0" i="1" smtClean="0">
+                              <a:latin typeface="Cambria Math" panose="02040503050406030204" pitchFamily="18" charset="0"/>
+                            </a:rPr>
+                          </m:ctrlPr>
+                        </m:fPr>
+                        <m:num>
+                          <m:r>
+                            <a:rPr lang="en-GB" b="0" i="1" smtClean="0">
+                              <a:latin typeface="Cambria Math" panose="02040503050406030204" pitchFamily="18" charset="0"/>
+                            </a:rPr>
+                            <m:t>𝐿</m:t>
+                          </m:r>
+                          <m:d>
+                            <m:dPr>
+                              <m:ctrlPr>
+                                <a:rPr lang="en-GB" b="0" i="1" smtClean="0">
+                                  <a:latin typeface="Cambria Math" panose="02040503050406030204" pitchFamily="18" charset="0"/>
+                                </a:rPr>
+                              </m:ctrlPr>
+                            </m:dPr>
+                            <m:e>
+                              <m:r>
+                                <a:rPr lang="en-GB" b="0" i="1" smtClean="0">
+                                  <a:latin typeface="Cambria Math" panose="02040503050406030204" pitchFamily="18" charset="0"/>
+                                </a:rPr>
+                                <m:t>𝜃</m:t>
+                              </m:r>
+                            </m:e>
+                          </m:d>
+                          <m:r>
+                            <a:rPr lang="en-GB" b="0" i="1" smtClean="0">
+                              <a:latin typeface="Cambria Math" panose="02040503050406030204" pitchFamily="18" charset="0"/>
+                            </a:rPr>
+                            <m:t>𝜋</m:t>
+                          </m:r>
+                          <m:r>
+                            <a:rPr lang="en-GB" b="0" i="1" smtClean="0">
+                              <a:latin typeface="Cambria Math" panose="02040503050406030204" pitchFamily="18" charset="0"/>
+                            </a:rPr>
+                            <m:t>(</m:t>
+                          </m:r>
+                          <m:r>
+                            <a:rPr lang="en-GB" b="0" i="1" smtClean="0">
+                              <a:latin typeface="Cambria Math" panose="02040503050406030204" pitchFamily="18" charset="0"/>
+                            </a:rPr>
+                            <m:t>𝜃</m:t>
+                          </m:r>
+                          <m:r>
+                            <a:rPr lang="en-GB" b="0" i="1" smtClean="0">
+                              <a:latin typeface="Cambria Math" panose="02040503050406030204" pitchFamily="18" charset="0"/>
+                            </a:rPr>
+                            <m:t>)</m:t>
+                          </m:r>
+                        </m:num>
+                        <m:den>
+                          <m:r>
+                            <a:rPr lang="en-GB" b="0" i="1" smtClean="0">
+                              <a:latin typeface="Cambria Math" panose="02040503050406030204" pitchFamily="18" charset="0"/>
+                            </a:rPr>
+                            <m:t>𝑍</m:t>
+                          </m:r>
+                          <m:r>
+                            <a:rPr lang="en-GB" b="0" i="1" smtClean="0">
+                              <a:latin typeface="Cambria Math" panose="02040503050406030204" pitchFamily="18" charset="0"/>
+                            </a:rPr>
+                            <m:t> </m:t>
+                          </m:r>
+                          <m:r>
+                            <a:rPr lang="en-GB" b="0" i="1" smtClean="0">
+                              <a:latin typeface="Cambria Math" panose="02040503050406030204" pitchFamily="18" charset="0"/>
+                            </a:rPr>
+                            <m:t>𝜋</m:t>
+                          </m:r>
+                          <m:r>
+                            <a:rPr lang="en-GB" b="0" i="1" smtClean="0">
+                              <a:latin typeface="Cambria Math" panose="02040503050406030204" pitchFamily="18" charset="0"/>
+                            </a:rPr>
+                            <m:t>(</m:t>
+                          </m:r>
+                          <m:r>
+                            <a:rPr lang="en-GB" b="0" i="1" smtClean="0">
+                              <a:latin typeface="Cambria Math" panose="02040503050406030204" pitchFamily="18" charset="0"/>
+                            </a:rPr>
+                            <m:t>𝜃</m:t>
+                          </m:r>
+                          <m:r>
+                            <a:rPr lang="en-GB" b="0" i="1" smtClean="0">
+                              <a:latin typeface="Cambria Math" panose="02040503050406030204" pitchFamily="18" charset="0"/>
+                            </a:rPr>
+                            <m:t>)</m:t>
+                          </m:r>
+                        </m:den>
+                      </m:f>
+                      <m:r>
+                        <a:rPr lang="en-GB" b="0" i="1" smtClean="0">
+                          <a:latin typeface="Cambria Math" panose="02040503050406030204" pitchFamily="18" charset="0"/>
+                        </a:rPr>
+                        <m:t>= </m:t>
+                      </m:r>
+                      <m:f>
+                        <m:fPr>
+                          <m:ctrlPr>
+                            <a:rPr lang="en-GB" b="0" i="1" smtClean="0">
+                              <a:latin typeface="Cambria Math" panose="02040503050406030204" pitchFamily="18" charset="0"/>
+                            </a:rPr>
+                          </m:ctrlPr>
+                        </m:fPr>
+                        <m:num>
+                          <m:r>
+                            <a:rPr lang="en-GB" b="0" i="1" smtClean="0">
+                              <a:latin typeface="Cambria Math" panose="02040503050406030204" pitchFamily="18" charset="0"/>
+                            </a:rPr>
+                            <m:t>𝐿</m:t>
+                          </m:r>
+                          <m:r>
+                            <a:rPr lang="en-GB" b="0" i="1" smtClean="0">
+                              <a:latin typeface="Cambria Math" panose="02040503050406030204" pitchFamily="18" charset="0"/>
+                            </a:rPr>
+                            <m:t>(</m:t>
+                          </m:r>
+                          <m:r>
+                            <a:rPr lang="en-GB" b="0" i="1" smtClean="0">
+                              <a:latin typeface="Cambria Math" panose="02040503050406030204" pitchFamily="18" charset="0"/>
+                            </a:rPr>
+                            <m:t>𝜃</m:t>
+                          </m:r>
+                          <m:r>
+                            <a:rPr lang="en-GB" b="0" i="1" smtClean="0">
+                              <a:latin typeface="Cambria Math" panose="02040503050406030204" pitchFamily="18" charset="0"/>
+                            </a:rPr>
+                            <m:t>)</m:t>
+                          </m:r>
+                        </m:num>
+                        <m:den>
+                          <m:r>
+                            <a:rPr lang="en-GB" b="0" i="1" smtClean="0">
+                              <a:latin typeface="Cambria Math" panose="02040503050406030204" pitchFamily="18" charset="0"/>
+                            </a:rPr>
+                            <m:t>𝑍</m:t>
+                          </m:r>
+                        </m:den>
+                      </m:f>
+                      <m:r>
+                        <a:rPr lang="en-GB" b="0" i="1" smtClean="0">
+                          <a:latin typeface="Cambria Math" panose="02040503050406030204" pitchFamily="18" charset="0"/>
+                        </a:rPr>
+                        <m:t> </m:t>
+                      </m:r>
+                    </m:oMath>
+                  </m:oMathPara>
+                </a14:m>
+                <a:endParaRPr lang="en-GB" dirty="0"/>
+              </a:p>
+            </p:txBody>
+          </p:sp>
+        </mc:Choice>
+        <mc:Fallback>
+          <p:sp>
+            <p:nvSpPr>
+              <p:cNvPr id="3" name="Content Placeholder 2">
+                <a:extLst>
+                  <a:ext uri="{FF2B5EF4-FFF2-40B4-BE49-F238E27FC236}">
+                    <a16:creationId xmlns:a16="http://schemas.microsoft.com/office/drawing/2014/main" id="{E8875089-E0CA-BAAB-8119-D759BDD7DFD5}"/>
+                  </a:ext>
+                </a:extLst>
+              </p:cNvPr>
+              <p:cNvSpPr>
+                <a:spLocks noGrp="1" noRot="1" noChangeAspect="1" noMove="1" noResize="1" noEditPoints="1" noAdjustHandles="1" noChangeArrowheads="1" noChangeShapeType="1" noTextEdit="1"/>
+              </p:cNvSpPr>
+              <p:nvPr>
+                <p:ph idx="1"/>
+              </p:nvPr>
+            </p:nvSpPr>
+            <p:spPr>
+              <a:xfrm>
+                <a:off x="838200" y="1614009"/>
+                <a:ext cx="10054820" cy="4562954"/>
+              </a:xfrm>
+              <a:blipFill>
+                <a:blip r:embed="rId2"/>
+                <a:stretch>
+                  <a:fillRect l="-758" t="-2778" r="-758"/>
+                </a:stretch>
+              </a:blipFill>
+            </p:spPr>
+            <p:txBody>
+              <a:bodyPr/>
+              <a:lstStyle/>
+              <a:p>
+                <a:r>
+                  <a:rPr lang="en-US">
+                    <a:noFill/>
+                  </a:rPr>
+                  <a:t> </a:t>
+                </a:r>
+              </a:p>
+            </p:txBody>
+          </p:sp>
+        </mc:Fallback>
+      </mc:AlternateContent>
+    </p:spTree>
+    <p:extLst>
+      <p:ext uri="{BB962C8B-B14F-4D97-AF65-F5344CB8AC3E}">
+        <p14:creationId xmlns:p14="http://schemas.microsoft.com/office/powerpoint/2010/main" val="3677610902"/>
+      </p:ext>
+    </p:extLst>
+  </p:cSld>
+  <p:clrMapOvr>
+    <a:masterClrMapping/>
+  </p:clrMapOvr>
+</p:sld>
+</file>
+
+<file path=ppt/slides/slide27.xml><?xml version="1.0" encoding="utf-8"?>
+<p:sld xmlns:a="http://schemas.openxmlformats.org/drawingml/2006/main" xmlns:r="http://schemas.openxmlformats.org/officeDocument/2006/relationships" xmlns:p="http://schemas.openxmlformats.org/presentationml/2006/main">
+  <p:cSld>
+    <p:spTree>
+      <p:nvGrpSpPr>
+        <p:cNvPr id="1" name=""/>
+        <p:cNvGrpSpPr/>
+        <p:nvPr/>
+      </p:nvGrpSpPr>
+      <p:grpSpPr>
+        <a:xfrm>
+          <a:off x="0" y="0"/>
+          <a:ext cx="0" cy="0"/>
+          <a:chOff x="0" y="0"/>
+          <a:chExt cx="0" cy="0"/>
+        </a:xfrm>
+      </p:grpSpPr>
+      <p:sp>
+        <p:nvSpPr>
+          <p:cNvPr id="2" name="Title 1">
+            <a:extLst>
+              <a:ext uri="{FF2B5EF4-FFF2-40B4-BE49-F238E27FC236}">
+                <a16:creationId xmlns:a16="http://schemas.microsoft.com/office/drawing/2014/main" id="{BA657AB3-EDFB-007E-B0AC-C4711988CC5E}"/>
+              </a:ext>
+            </a:extLst>
+          </p:cNvPr>
+          <p:cNvSpPr>
+            <a:spLocks noGrp="1"/>
+          </p:cNvSpPr>
+          <p:nvPr>
+            <p:ph type="title"/>
+          </p:nvPr>
+        </p:nvSpPr>
+        <p:spPr/>
+        <p:txBody>
+          <a:bodyPr/>
+          <a:lstStyle/>
+          <a:p>
+            <a:r>
+              <a:rPr lang="en-US" dirty="0">
+                <a:solidFill>
+                  <a:srgbClr val="C00000"/>
+                </a:solidFill>
+              </a:rPr>
+              <a:t>As a classification problem</a:t>
+            </a:r>
+          </a:p>
+        </p:txBody>
+      </p:sp>
+      <p:sp>
+        <p:nvSpPr>
+          <p:cNvPr id="4" name="Footer Placeholder 3">
+            <a:extLst>
+              <a:ext uri="{FF2B5EF4-FFF2-40B4-BE49-F238E27FC236}">
+                <a16:creationId xmlns:a16="http://schemas.microsoft.com/office/drawing/2014/main" id="{5B37B85D-4118-2515-D53D-475C4E66C472}"/>
+              </a:ext>
+            </a:extLst>
+          </p:cNvPr>
+          <p:cNvSpPr>
+            <a:spLocks noGrp="1"/>
+          </p:cNvSpPr>
+          <p:nvPr>
+            <p:ph type="ftr" sz="quarter" idx="11"/>
+          </p:nvPr>
+        </p:nvSpPr>
+        <p:spPr/>
+        <p:txBody>
+          <a:bodyPr/>
+          <a:lstStyle/>
+          <a:p>
+            <a:r>
+              <a:rPr lang="en-US"/>
+              <a:t>MPhil in DIS - Data Driven Radio Astronomy in the SKA era</a:t>
+            </a:r>
+          </a:p>
+        </p:txBody>
+      </p:sp>
+      <p:sp>
+        <p:nvSpPr>
+          <p:cNvPr id="5" name="Slide Number Placeholder 4">
+            <a:extLst>
+              <a:ext uri="{FF2B5EF4-FFF2-40B4-BE49-F238E27FC236}">
+                <a16:creationId xmlns:a16="http://schemas.microsoft.com/office/drawing/2014/main" id="{DF1CED66-178C-490A-3189-D188E2783F5F}"/>
+              </a:ext>
+            </a:extLst>
+          </p:cNvPr>
+          <p:cNvSpPr>
+            <a:spLocks noGrp="1"/>
+          </p:cNvSpPr>
+          <p:nvPr>
+            <p:ph type="sldNum" sz="quarter" idx="12"/>
+          </p:nvPr>
+        </p:nvSpPr>
+        <p:spPr/>
+        <p:txBody>
+          <a:bodyPr/>
+          <a:lstStyle/>
+          <a:p>
+            <a:fld id="{9AA976C4-0B8A-7C44-883E-604AFF758C0B}" type="slidenum">
+              <a:rPr lang="en-US" smtClean="0"/>
+              <a:t>27</a:t>
+            </a:fld>
+            <a:endParaRPr lang="en-US"/>
+          </a:p>
+        </p:txBody>
+      </p:sp>
+      <p:sp>
+        <p:nvSpPr>
+          <p:cNvPr id="6" name="Date Placeholder 5">
+            <a:extLst>
+              <a:ext uri="{FF2B5EF4-FFF2-40B4-BE49-F238E27FC236}">
+                <a16:creationId xmlns:a16="http://schemas.microsoft.com/office/drawing/2014/main" id="{4E6B5B9F-EDA9-548A-4004-336F2CE389B6}"/>
+              </a:ext>
+            </a:extLst>
+          </p:cNvPr>
+          <p:cNvSpPr>
+            <a:spLocks noGrp="1"/>
+          </p:cNvSpPr>
+          <p:nvPr>
+            <p:ph type="dt" sz="half" idx="10"/>
+          </p:nvPr>
+        </p:nvSpPr>
+        <p:spPr/>
+        <p:txBody>
+          <a:bodyPr/>
+          <a:lstStyle/>
+          <a:p>
+            <a:r>
+              <a:rPr lang="en-GB"/>
+              <a:t>2024</a:t>
+            </a:r>
+            <a:endParaRPr lang="en-US"/>
+          </a:p>
+        </p:txBody>
+      </p:sp>
+      <mc:AlternateContent xmlns:mc="http://schemas.openxmlformats.org/markup-compatibility/2006">
+        <mc:Choice xmlns:a14="http://schemas.microsoft.com/office/drawing/2010/main" Requires="a14">
+          <p:sp>
+            <p:nvSpPr>
+              <p:cNvPr id="3" name="Content Placeholder 2">
+                <a:extLst>
+                  <a:ext uri="{FF2B5EF4-FFF2-40B4-BE49-F238E27FC236}">
+                    <a16:creationId xmlns:a16="http://schemas.microsoft.com/office/drawing/2014/main" id="{E8875089-E0CA-BAAB-8119-D759BDD7DFD5}"/>
+                  </a:ext>
+                </a:extLst>
+              </p:cNvPr>
+              <p:cNvSpPr>
+                <a:spLocks noGrp="1"/>
+              </p:cNvSpPr>
+              <p:nvPr>
+                <p:ph idx="1"/>
+              </p:nvPr>
+            </p:nvSpPr>
+            <p:spPr>
+              <a:xfrm>
+                <a:off x="838200" y="1614009"/>
+                <a:ext cx="10054820" cy="4562954"/>
+              </a:xfrm>
+            </p:spPr>
+            <p:txBody>
+              <a:bodyPr>
+                <a:normAutofit/>
+              </a:bodyPr>
+              <a:lstStyle/>
+              <a:p>
+                <a:r>
+                  <a:rPr lang="en-GB" dirty="0"/>
+                  <a:t>The network learns what kind of data different sets of parameters produce</a:t>
+                </a:r>
+              </a:p>
+              <a:p>
+                <a:endParaRPr lang="en-GB" dirty="0"/>
+              </a:p>
+              <a:p>
+                <a:r>
+                  <a:rPr lang="en-GB" dirty="0"/>
+                  <a:t>We then feed the network the real data that we have observed and samples of </a:t>
+                </a:r>
+                <a14:m>
+                  <m:oMath xmlns:m="http://schemas.openxmlformats.org/officeDocument/2006/math">
+                    <m:r>
+                      <a:rPr lang="en-GB" b="0" i="1" smtClean="0">
+                        <a:latin typeface="Cambria Math" panose="02040503050406030204" pitchFamily="18" charset="0"/>
+                      </a:rPr>
+                      <m:t>𝜃</m:t>
+                    </m:r>
+                  </m:oMath>
+                </a14:m>
+                <a:r>
+                  <a:rPr lang="en-GB" dirty="0"/>
+                  <a:t> from a prior to recover a posterior as</a:t>
+                </a:r>
+              </a:p>
+              <a:p>
+                <a:endParaRPr lang="en-GB" dirty="0"/>
+              </a:p>
+              <a:p>
+                <a:pPr marL="0" indent="0">
+                  <a:buNone/>
+                </a:pPr>
+                <a14:m>
+                  <m:oMathPara xmlns:m="http://schemas.openxmlformats.org/officeDocument/2006/math">
+                    <m:oMathParaPr>
+                      <m:jc m:val="centerGroup"/>
+                    </m:oMathParaPr>
+                    <m:oMath xmlns:m="http://schemas.openxmlformats.org/officeDocument/2006/math">
+                      <m:r>
+                        <a:rPr lang="en-GB" b="0" i="1" smtClean="0">
+                          <a:latin typeface="Cambria Math" panose="02040503050406030204" pitchFamily="18" charset="0"/>
+                        </a:rPr>
+                        <m:t>𝑃</m:t>
+                      </m:r>
+                      <m:d>
+                        <m:dPr>
+                          <m:ctrlPr>
+                            <a:rPr lang="en-GB" b="0" i="1" smtClean="0">
+                              <a:latin typeface="Cambria Math" panose="02040503050406030204" pitchFamily="18" charset="0"/>
+                            </a:rPr>
+                          </m:ctrlPr>
+                        </m:dPr>
+                        <m:e>
+                          <m:r>
+                            <a:rPr lang="en-GB" b="0" i="1" smtClean="0">
+                              <a:latin typeface="Cambria Math" panose="02040503050406030204" pitchFamily="18" charset="0"/>
+                            </a:rPr>
+                            <m:t>𝜃</m:t>
+                          </m:r>
+                        </m:e>
+                        <m:e>
+                          <m:r>
+                            <a:rPr lang="en-GB" b="0" i="1" smtClean="0">
+                              <a:latin typeface="Cambria Math" panose="02040503050406030204" pitchFamily="18" charset="0"/>
+                            </a:rPr>
+                            <m:t>𝐷</m:t>
+                          </m:r>
+                        </m:e>
+                      </m:d>
+                      <m:r>
+                        <a:rPr lang="en-GB" b="0" i="1" smtClean="0">
+                          <a:latin typeface="Cambria Math" panose="02040503050406030204" pitchFamily="18" charset="0"/>
+                        </a:rPr>
+                        <m:t>=</m:t>
+                      </m:r>
+                      <m:r>
+                        <a:rPr lang="en-GB" b="0" i="1" smtClean="0">
+                          <a:latin typeface="Cambria Math" panose="02040503050406030204" pitchFamily="18" charset="0"/>
+                        </a:rPr>
+                        <m:t>𝑟</m:t>
+                      </m:r>
+                      <m:r>
+                        <a:rPr lang="en-GB" b="0" i="1" smtClean="0">
+                          <a:latin typeface="Cambria Math" panose="02040503050406030204" pitchFamily="18" charset="0"/>
+                        </a:rPr>
+                        <m:t> </m:t>
+                      </m:r>
+                      <m:r>
+                        <a:rPr lang="en-GB" b="0" i="1" smtClean="0">
+                          <a:latin typeface="Cambria Math" panose="02040503050406030204" pitchFamily="18" charset="0"/>
+                        </a:rPr>
+                        <m:t>𝜋</m:t>
+                      </m:r>
+                      <m:d>
+                        <m:dPr>
+                          <m:ctrlPr>
+                            <a:rPr lang="en-GB" b="0" i="1" smtClean="0">
+                              <a:latin typeface="Cambria Math" panose="02040503050406030204" pitchFamily="18" charset="0"/>
+                            </a:rPr>
+                          </m:ctrlPr>
+                        </m:dPr>
+                        <m:e>
+                          <m:r>
+                            <a:rPr lang="en-GB" b="0" i="1" smtClean="0">
+                              <a:latin typeface="Cambria Math" panose="02040503050406030204" pitchFamily="18" charset="0"/>
+                            </a:rPr>
+                            <m:t>𝜃</m:t>
+                          </m:r>
+                        </m:e>
+                      </m:d>
+                      <m:r>
+                        <a:rPr lang="en-GB" b="0" i="1" smtClean="0">
+                          <a:latin typeface="Cambria Math" panose="02040503050406030204" pitchFamily="18" charset="0"/>
+                        </a:rPr>
+                        <m:t>= </m:t>
+                      </m:r>
+                      <m:f>
+                        <m:fPr>
+                          <m:ctrlPr>
+                            <a:rPr lang="en-GB" b="0" i="1" smtClean="0">
+                              <a:latin typeface="Cambria Math" panose="02040503050406030204" pitchFamily="18" charset="0"/>
+                            </a:rPr>
+                          </m:ctrlPr>
+                        </m:fPr>
+                        <m:num>
+                          <m:r>
+                            <a:rPr lang="en-GB" b="0" i="1" smtClean="0">
+                              <a:latin typeface="Cambria Math" panose="02040503050406030204" pitchFamily="18" charset="0"/>
+                            </a:rPr>
+                            <m:t>𝐿</m:t>
+                          </m:r>
+                          <m:r>
+                            <a:rPr lang="en-GB" b="0" i="1" smtClean="0">
+                              <a:latin typeface="Cambria Math" panose="02040503050406030204" pitchFamily="18" charset="0"/>
+                            </a:rPr>
+                            <m:t>(</m:t>
+                          </m:r>
+                          <m:r>
+                            <a:rPr lang="en-GB" b="0" i="1" smtClean="0">
+                              <a:latin typeface="Cambria Math" panose="02040503050406030204" pitchFamily="18" charset="0"/>
+                            </a:rPr>
+                            <m:t>𝜃</m:t>
+                          </m:r>
+                          <m:r>
+                            <a:rPr lang="en-GB" b="0" i="1" smtClean="0">
+                              <a:latin typeface="Cambria Math" panose="02040503050406030204" pitchFamily="18" charset="0"/>
+                            </a:rPr>
+                            <m:t>)</m:t>
+                          </m:r>
+                        </m:num>
+                        <m:den>
+                          <m:r>
+                            <a:rPr lang="en-GB" b="0" i="1" smtClean="0">
+                              <a:latin typeface="Cambria Math" panose="02040503050406030204" pitchFamily="18" charset="0"/>
+                            </a:rPr>
+                            <m:t>𝑍</m:t>
+                          </m:r>
+                        </m:den>
+                      </m:f>
+                      <m:r>
+                        <a:rPr lang="en-GB" b="0" i="1" smtClean="0">
+                          <a:latin typeface="Cambria Math" panose="02040503050406030204" pitchFamily="18" charset="0"/>
+                        </a:rPr>
+                        <m:t> </m:t>
+                      </m:r>
+                      <m:r>
+                        <a:rPr lang="en-GB" b="0" i="1" smtClean="0">
+                          <a:latin typeface="Cambria Math" panose="02040503050406030204" pitchFamily="18" charset="0"/>
+                        </a:rPr>
+                        <m:t>𝜋</m:t>
+                      </m:r>
+                      <m:r>
+                        <a:rPr lang="en-GB" b="0" i="1" smtClean="0">
+                          <a:latin typeface="Cambria Math" panose="02040503050406030204" pitchFamily="18" charset="0"/>
+                        </a:rPr>
+                        <m:t>(</m:t>
+                      </m:r>
+                      <m:r>
+                        <a:rPr lang="en-GB" b="0" i="1" smtClean="0">
+                          <a:latin typeface="Cambria Math" panose="02040503050406030204" pitchFamily="18" charset="0"/>
+                        </a:rPr>
+                        <m:t>𝜃</m:t>
+                      </m:r>
+                      <m:r>
+                        <a:rPr lang="en-GB" b="0" i="1" smtClean="0">
+                          <a:latin typeface="Cambria Math" panose="02040503050406030204" pitchFamily="18" charset="0"/>
+                        </a:rPr>
+                        <m:t>)</m:t>
+                      </m:r>
+                    </m:oMath>
+                  </m:oMathPara>
+                </a14:m>
+                <a:endParaRPr lang="en-GB" dirty="0"/>
+              </a:p>
+              <a:p>
+                <a:pPr marL="0" indent="0">
+                  <a:buNone/>
+                </a:pPr>
+                <a:endParaRPr lang="en-GB" dirty="0"/>
+              </a:p>
+              <a:p>
+                <a:r>
+                  <a:rPr lang="en-GB" dirty="0"/>
+                  <a:t>Sampling is best performed by NS or MCMC </a:t>
+                </a:r>
+              </a:p>
+              <a:p>
+                <a:endParaRPr lang="en-GB" dirty="0"/>
+              </a:p>
+              <a:p>
+                <a:endParaRPr lang="en-GB" dirty="0"/>
+              </a:p>
+            </p:txBody>
+          </p:sp>
+        </mc:Choice>
+        <mc:Fallback>
+          <p:sp>
+            <p:nvSpPr>
+              <p:cNvPr id="3" name="Content Placeholder 2">
+                <a:extLst>
+                  <a:ext uri="{FF2B5EF4-FFF2-40B4-BE49-F238E27FC236}">
+                    <a16:creationId xmlns:a16="http://schemas.microsoft.com/office/drawing/2014/main" id="{E8875089-E0CA-BAAB-8119-D759BDD7DFD5}"/>
+                  </a:ext>
+                </a:extLst>
+              </p:cNvPr>
+              <p:cNvSpPr>
+                <a:spLocks noGrp="1" noRot="1" noChangeAspect="1" noMove="1" noResize="1" noEditPoints="1" noAdjustHandles="1" noChangeArrowheads="1" noChangeShapeType="1" noTextEdit="1"/>
+              </p:cNvSpPr>
+              <p:nvPr>
+                <p:ph idx="1"/>
+              </p:nvPr>
+            </p:nvSpPr>
+            <p:spPr>
+              <a:xfrm>
+                <a:off x="838200" y="1614009"/>
+                <a:ext cx="10054820" cy="4562954"/>
+              </a:xfrm>
+              <a:blipFill>
+                <a:blip r:embed="rId2"/>
+                <a:stretch>
+                  <a:fillRect l="-1136" t="-2222" r="-379" b="-2778"/>
+                </a:stretch>
+              </a:blipFill>
+            </p:spPr>
+            <p:txBody>
+              <a:bodyPr/>
+              <a:lstStyle/>
+              <a:p>
+                <a:r>
+                  <a:rPr lang="en-US">
+                    <a:noFill/>
+                  </a:rPr>
+                  <a:t> </a:t>
+                </a:r>
+              </a:p>
+            </p:txBody>
+          </p:sp>
+        </mc:Fallback>
+      </mc:AlternateContent>
+    </p:spTree>
+    <p:extLst>
+      <p:ext uri="{BB962C8B-B14F-4D97-AF65-F5344CB8AC3E}">
+        <p14:creationId xmlns:p14="http://schemas.microsoft.com/office/powerpoint/2010/main" val="908830480"/>
       </p:ext>
     </p:extLst>
   </p:cSld>
@@ -8727,7 +11725,7 @@
         </p:spPr>
         <p:txBody>
           <a:bodyPr>
-            <a:normAutofit fontScale="85000" lnSpcReduction="20000"/>
+            <a:normAutofit lnSpcReduction="10000"/>
           </a:bodyPr>
           <a:lstStyle/>
           <a:p>
@@ -8759,22 +11757,12 @@
           </a:p>
           <a:p>
             <a:r>
-              <a:rPr lang="en-US" dirty="0" err="1"/>
-              <a:t>Benificial</a:t>
-            </a:r>
-            <a:r>
-              <a:rPr lang="en-US" dirty="0"/>
-              <a:t> when we can not analytically write the likelihood, we do not know the noise distribution in our data or the analytic likelihood is too computationally expensive</a:t>
-            </a:r>
-          </a:p>
-          <a:p>
-            <a:endParaRPr lang="en-US" dirty="0"/>
-          </a:p>
-          <a:p>
-            <a:r>
               <a:rPr lang="en-US" dirty="0"/>
               <a:t>Simulations here includes the physics we are interested in, and contaminating signals, the noise and the impact of the instrument we are observing with</a:t>
             </a:r>
+          </a:p>
+          <a:p>
+            <a:endParaRPr lang="en-US" dirty="0"/>
           </a:p>
         </p:txBody>
       </p:sp>
@@ -8955,12 +11943,8 @@
           <a:lstStyle/>
           <a:p>
             <a:r>
-              <a:rPr lang="en-US" dirty="0" err="1"/>
-              <a:t>Benificial</a:t>
-            </a:r>
-            <a:r>
               <a:rPr lang="en-US" dirty="0"/>
-              <a:t> when we can not analytically write the likelihood, we do not know the noise distribution in our data or the analytic likelihood is too computationally expensive</a:t>
+              <a:t>Beneficial when we can not analytically write the likelihood, we do not know the noise distribution in our data or the analytic likelihood is too computationally expensive</a:t>
             </a:r>
           </a:p>
           <a:p>
@@ -9291,8 +12275,8 @@
           </a:p>
         </p:txBody>
       </p:sp>
-      <mc:AlternateContent xmlns:mc="http://schemas.openxmlformats.org/markup-compatibility/2006">
-        <mc:Choice xmlns:a14="http://schemas.microsoft.com/office/drawing/2010/main" Requires="a14">
+      <mc:AlternateContent xmlns:mc="http://schemas.openxmlformats.org/markup-compatibility/2006" xmlns:a14="http://schemas.microsoft.com/office/drawing/2010/main">
+        <mc:Choice Requires="a14">
           <p:sp>
             <p:nvSpPr>
               <p:cNvPr id="3" name="Content Placeholder 2">
@@ -9469,7 +12453,7 @@
             </p:txBody>
           </p:sp>
         </mc:Choice>
-        <mc:Fallback>
+        <mc:Fallback xmlns="">
           <p:sp>
             <p:nvSpPr>
               <p:cNvPr id="3" name="Content Placeholder 2">
@@ -9661,8 +12645,8 @@
           </a:p>
         </p:txBody>
       </p:sp>
-      <mc:AlternateContent xmlns:mc="http://schemas.openxmlformats.org/markup-compatibility/2006">
-        <mc:Choice xmlns:a14="http://schemas.microsoft.com/office/drawing/2010/main" Requires="a14">
+      <mc:AlternateContent xmlns:mc="http://schemas.openxmlformats.org/markup-compatibility/2006" xmlns:a14="http://schemas.microsoft.com/office/drawing/2010/main">
+        <mc:Choice Requires="a14">
           <p:sp>
             <p:nvSpPr>
               <p:cNvPr id="3" name="Content Placeholder 2">
@@ -9900,7 +12884,7 @@
             </p:txBody>
           </p:sp>
         </mc:Choice>
-        <mc:Fallback>
+        <mc:Fallback xmlns="">
           <p:sp>
             <p:nvSpPr>
               <p:cNvPr id="3" name="Content Placeholder 2">

</xml_diff>